<commit_message>
Regenerate presales documents with Cost sheet template
- Regenerate all infrastructure costs with 11pt font and Cost sheet styling
- Update solution template and AWS IDP with new template properties
- Add missing infrastructure costs CSV files for Azure solutions
- Update discovery questionnaires and level of effort estimates
- Refresh all solution briefings and statements of work
</commit_message>
<xml_diff>
--- a/solutions/azure/cyber-security/sentinel-siem/presales/solution-briefing.pptx
+++ b/solutions/azure/cyber-security/sentinel-siem/presales/solution-briefing.pptx
@@ -3361,7 +3361,7 @@
           <a:lstStyle/>
           <a:p>
             <a:r>
-              <a:t>Alison Smith | November 17, 2025</a:t>
+              <a:t>Alison Smith | November 18, 2025</a:t>
             </a:r>
           </a:p>
         </p:txBody>
@@ -5037,7 +5037,7 @@
               <a:t>Phase 1: Foundation &amp; Planning</a:t>
             </a:r>
             <a:r>
-              <a:t> *(Months 1-2)*</a:t>
+              <a:t> (Months 1-2)</a:t>
             </a:r>
           </a:p>
           <a:p>
@@ -5065,7 +5065,7 @@
               <a:t>Phase 2: Core Implementation</a:t>
             </a:r>
             <a:r>
-              <a:t> *(Months 3-4)*</a:t>
+              <a:t> (Months 3-4)</a:t>
             </a:r>
           </a:p>
           <a:p>
@@ -5093,7 +5093,7 @@
               <a:t>Phase 3: Deployment &amp; Optimization</a:t>
             </a:r>
             <a:r>
-              <a:t> *(Months 5-6)*</a:t>
+              <a:t> (Months 5-6)</a:t>
             </a:r>
           </a:p>
           <a:p>

</xml_diff>

<commit_message>
Fix solution-briefing validation errors and regenerate PPTX files for all Azure solutions
Applied critical fixes to solution-briefing.md for all 6 Azure solutions:

1. Partnership Advantage: Reduced from 10-12 bullets to exactly 8 (4 per column)
2. Next Steps: Changed from grouped structure to 5 flat bullets
3. Investment Summary TABLE_CONFIG: Fixed widths to [25, 15, 15, 15, 12, 12, 15]
4. Speaker Notes: Added 'Credit Program Talking Points' and 'Call to Action' sections
5. Business Opportunity (virtual-desktop): Reduced from 8 to 6 bullets

Solutions fixed:
- azure/ai/document-intelligence
- azure/cloud/enterprise-landing-zone
- azure/cyber-security/sentinel-siem
- azure/devops/enterprise-platform
- azure/modern-workspace/virtual-desktop
- azure/network/virtual-wan-global

All PPTX files successfully regenerated with new timestamps (Nov 22 16:55 - 17:10).

🤖 Generated with Claude Code (https://claude.com/claude-code)

Co-Authored-By: Claude <noreply@anthropic.com>
</commit_message>
<xml_diff>
--- a/solutions/azure/cyber-security/sentinel-siem/presales/solution-briefing.pptx
+++ b/solutions/azure/cyber-security/sentinel-siem/presales/solution-briefing.pptx
@@ -118,6 +118,9 @@
     <p:ext uri="{EFAFB233-063F-42B5-8137-9DF3F51BA10A}">
       <p15:sldGuideLst xmlns:p15="http://schemas.microsoft.com/office/powerpoint/2012/main"/>
     </p:ext>
+    <p:ext uri="{2D200454-40CA-4A62-9FC3-DE9A4176ACB9}">
+      <p15:notesGuideLst xmlns:p15="http://schemas.microsoft.com/office/powerpoint/2012/main"/>
+    </p:ext>
   </p:extLst>
 </p:presentation>
 </file>
@@ -144,6 +147,59 @@
           <a:chExt cx="0" cy="0"/>
         </a:xfrm>
       </p:grpSpPr>
+      <p:sp>
+        <p:nvSpPr>
+          <p:cNvPr id="2" name="Slide Image Placeholder 1"/>
+          <p:cNvSpPr>
+            <a:spLocks noGrp="1" noRot="1" noChangeAspect="1"/>
+          </p:cNvSpPr>
+          <p:nvPr>
+            <p:ph type="sldImg"/>
+          </p:nvPr>
+        </p:nvSpPr>
+        <p:spPr>
+          <a:xfrm>
+            <a:off x="-171450" y="1143000"/>
+            <a:ext cx="5486400" cy="3086100"/>
+          </a:xfrm>
+          <a:prstGeom prst="rect">
+            <a:avLst/>
+          </a:prstGeom>
+          <a:noFill/>
+          <a:ln w="12700">
+            <a:solidFill>
+              <a:prstClr val="black"/>
+            </a:solidFill>
+          </a:ln>
+        </p:spPr>
+      </p:sp>
+      <p:sp>
+        <p:nvSpPr>
+          <p:cNvPr id="3" name="Notes Placeholder 2"/>
+          <p:cNvSpPr>
+            <a:spLocks noGrp="1"/>
+          </p:cNvSpPr>
+          <p:nvPr>
+            <p:ph type="body" idx="1"/>
+          </p:nvPr>
+        </p:nvSpPr>
+        <p:spPr>
+          <a:xfrm>
+            <a:off x="514350" y="4400550"/>
+            <a:ext cx="4114800" cy="3600450"/>
+          </a:xfrm>
+          <a:prstGeom prst="rect">
+            <a:avLst/>
+          </a:prstGeom>
+        </p:spPr>
+        <p:txBody>
+          <a:bodyPr/>
+          <a:lstStyle/>
+          <a:p>
+            <a:endParaRPr lang="en-US"/>
+          </a:p>
+        </p:txBody>
+      </p:sp>
     </p:spTree>
     <p:extLst>
       <p:ext uri="{BB962C8B-B14F-4D97-AF65-F5344CB8AC3E}">
@@ -247,131 +303,6 @@
 </p:notesMaster>
 </file>
 
-<file path=ppt/notesSlides/notesSlide1.xml><?xml version="1.0" encoding="utf-8"?>
-<p:notes xmlns:a="http://schemas.openxmlformats.org/drawingml/2006/main" xmlns:p="http://schemas.openxmlformats.org/presentationml/2006/main" xmlns:r="http://schemas.openxmlformats.org/officeDocument/2006/relationships">
-  <p:cSld>
-    <p:spTree>
-      <p:nvGrpSpPr>
-        <p:cNvPr id="1" name=""/>
-        <p:cNvGrpSpPr/>
-        <p:nvPr/>
-      </p:nvGrpSpPr>
-      <p:grpSpPr>
-        <a:xfrm>
-          <a:off x="0" y="0"/>
-          <a:ext cx="0" cy="0"/>
-          <a:chOff x="0" y="0"/>
-          <a:chExt cx="0" cy="0"/>
-        </a:xfrm>
-      </p:grpSpPr>
-    </p:spTree>
-  </p:cSld>
-  <p:clrMapOvr>
-    <a:masterClrMapping/>
-  </p:clrMapOvr>
-</p:notes>
-</file>
-
-<file path=ppt/notesSlides/notesSlide2.xml><?xml version="1.0" encoding="utf-8"?>
-<p:notes xmlns:a="http://schemas.openxmlformats.org/drawingml/2006/main" xmlns:p="http://schemas.openxmlformats.org/presentationml/2006/main" xmlns:r="http://schemas.openxmlformats.org/officeDocument/2006/relationships">
-  <p:cSld>
-    <p:spTree>
-      <p:nvGrpSpPr>
-        <p:cNvPr id="1" name=""/>
-        <p:cNvGrpSpPr/>
-        <p:nvPr/>
-      </p:nvGrpSpPr>
-      <p:grpSpPr>
-        <a:xfrm>
-          <a:off x="0" y="0"/>
-          <a:ext cx="0" cy="0"/>
-          <a:chOff x="0" y="0"/>
-          <a:chExt cx="0" cy="0"/>
-        </a:xfrm>
-      </p:grpSpPr>
-    </p:spTree>
-  </p:cSld>
-  <p:clrMapOvr>
-    <a:masterClrMapping/>
-  </p:clrMapOvr>
-</p:notes>
-</file>
-
-<file path=ppt/notesSlides/notesSlide3.xml><?xml version="1.0" encoding="utf-8"?>
-<p:notes xmlns:a="http://schemas.openxmlformats.org/drawingml/2006/main" xmlns:p="http://schemas.openxmlformats.org/presentationml/2006/main" xmlns:r="http://schemas.openxmlformats.org/officeDocument/2006/relationships">
-  <p:cSld>
-    <p:spTree>
-      <p:nvGrpSpPr>
-        <p:cNvPr id="1" name=""/>
-        <p:cNvGrpSpPr/>
-        <p:nvPr/>
-      </p:nvGrpSpPr>
-      <p:grpSpPr>
-        <a:xfrm>
-          <a:off x="0" y="0"/>
-          <a:ext cx="0" cy="0"/>
-          <a:chOff x="0" y="0"/>
-          <a:chExt cx="0" cy="0"/>
-        </a:xfrm>
-      </p:grpSpPr>
-    </p:spTree>
-  </p:cSld>
-  <p:clrMapOvr>
-    <a:masterClrMapping/>
-  </p:clrMapOvr>
-</p:notes>
-</file>
-
-<file path=ppt/notesSlides/notesSlide4.xml><?xml version="1.0" encoding="utf-8"?>
-<p:notes xmlns:a="http://schemas.openxmlformats.org/drawingml/2006/main" xmlns:p="http://schemas.openxmlformats.org/presentationml/2006/main" xmlns:r="http://schemas.openxmlformats.org/officeDocument/2006/relationships">
-  <p:cSld>
-    <p:spTree>
-      <p:nvGrpSpPr>
-        <p:cNvPr id="1" name=""/>
-        <p:cNvGrpSpPr/>
-        <p:nvPr/>
-      </p:nvGrpSpPr>
-      <p:grpSpPr>
-        <a:xfrm>
-          <a:off x="0" y="0"/>
-          <a:ext cx="0" cy="0"/>
-          <a:chOff x="0" y="0"/>
-          <a:chExt cx="0" cy="0"/>
-        </a:xfrm>
-      </p:grpSpPr>
-    </p:spTree>
-  </p:cSld>
-  <p:clrMapOvr>
-    <a:masterClrMapping/>
-  </p:clrMapOvr>
-</p:notes>
-</file>
-
-<file path=ppt/notesSlides/notesSlide5.xml><?xml version="1.0" encoding="utf-8"?>
-<p:notes xmlns:a="http://schemas.openxmlformats.org/drawingml/2006/main" xmlns:p="http://schemas.openxmlformats.org/presentationml/2006/main" xmlns:r="http://schemas.openxmlformats.org/officeDocument/2006/relationships">
-  <p:cSld>
-    <p:spTree>
-      <p:nvGrpSpPr>
-        <p:cNvPr id="1" name=""/>
-        <p:cNvGrpSpPr/>
-        <p:nvPr/>
-      </p:nvGrpSpPr>
-      <p:grpSpPr>
-        <a:xfrm>
-          <a:off x="0" y="0"/>
-          <a:ext cx="0" cy="0"/>
-          <a:chOff x="0" y="0"/>
-          <a:chExt cx="0" cy="0"/>
-        </a:xfrm>
-      </p:grpSpPr>
-    </p:spTree>
-  </p:cSld>
-  <p:clrMapOvr>
-    <a:masterClrMapping/>
-  </p:clrMapOvr>
-</p:notes>
-</file>
-
 <file path=ppt/slideLayouts/slideLayout1.xml><?xml version="1.0" encoding="utf-8"?>
 <p:sldLayout xmlns:a="http://schemas.openxmlformats.org/drawingml/2006/main" xmlns:r="http://schemas.openxmlformats.org/officeDocument/2006/relationships" xmlns:p="http://schemas.openxmlformats.org/presentationml/2006/main" preserve="1" userDrawn="1">
   <p:cSld name="EO Title Slide">
@@ -887,36 +818,6 @@
           </a:p>
         </p:txBody>
       </p:sp>
-      <p:pic>
-        <p:nvPicPr>
-          <p:cNvPr id="13" name="Image 0" descr="/home/claude/eo-framework-logo.png">
-            <a:extLst>
-              <a:ext uri="{FF2B5EF4-FFF2-40B4-BE49-F238E27FC236}">
-                <a16:creationId xmlns:a16="http://schemas.microsoft.com/office/drawing/2014/main" id="{25116040-BB88-891D-9118-628A78E99872}"/>
-              </a:ext>
-            </a:extLst>
-          </p:cNvPr>
-          <p:cNvPicPr>
-            <a:picLocks noChangeAspect="1"/>
-          </p:cNvPicPr>
-          <p:nvPr userDrawn="1"/>
-        </p:nvPicPr>
-        <p:blipFill>
-          <a:blip r:embed="rId2"/>
-          <a:stretch>
-            <a:fillRect/>
-          </a:stretch>
-        </p:blipFill>
-        <p:spPr>
-          <a:xfrm>
-            <a:off x="6945879" y="4648200"/>
-            <a:ext cx="1952244" cy="417576"/>
-          </a:xfrm>
-          <a:prstGeom prst="rect">
-            <a:avLst/>
-          </a:prstGeom>
-        </p:spPr>
-      </p:pic>
       <p:sp>
         <p:nvSpPr>
           <p:cNvPr id="4" name="Text Placeholder 3">
@@ -946,7 +847,7 @@
           <a:bodyPr/>
           <a:lstStyle>
             <a:lvl1pPr>
-              <a:defRPr sz="2000" baseline="0">
+              <a:defRPr sz="2000" b="1" baseline="0">
                 <a:solidFill>
                   <a:srgbClr val="C00000"/>
                 </a:solidFill>
@@ -992,6 +893,48 @@
             <a:r>
               <a:rPr lang="en-US" dirty="0"/>
               <a:t>Fourth level</a:t>
+            </a:r>
+          </a:p>
+        </p:txBody>
+      </p:sp>
+      <p:sp>
+        <p:nvSpPr>
+          <p:cNvPr id="5" name="Text Placeholder 4">
+            <a:extLst>
+              <a:ext uri="{FF2B5EF4-FFF2-40B4-BE49-F238E27FC236}">
+                <a16:creationId xmlns:a16="http://schemas.microsoft.com/office/drawing/2014/main" id="{57F71806-AFEA-DD6D-E6AA-E2A002E682DE}"/>
+              </a:ext>
+            </a:extLst>
+          </p:cNvPr>
+          <p:cNvSpPr>
+            <a:spLocks noGrp="1"/>
+          </p:cNvSpPr>
+          <p:nvPr>
+            <p:ph type="body" sz="quarter" idx="15" hasCustomPrompt="1"/>
+          </p:nvPr>
+        </p:nvSpPr>
+        <p:spPr>
+          <a:xfrm>
+            <a:off x="5627076" y="4738688"/>
+            <a:ext cx="3218473" cy="238125"/>
+          </a:xfrm>
+          <a:prstGeom prst="rect">
+            <a:avLst/>
+          </a:prstGeom>
+        </p:spPr>
+        <p:txBody>
+          <a:bodyPr/>
+          <a:lstStyle>
+            <a:lvl5pPr algn="r">
+              <a:buNone/>
+              <a:defRPr sz="1100"/>
+            </a:lvl5pPr>
+          </a:lstStyle>
+          <a:p>
+            <a:pPr lvl="4"/>
+            <a:r>
+              <a:rPr lang="en-US" dirty="0"/>
+              <a:t>Project Name</a:t>
             </a:r>
           </a:p>
         </p:txBody>
@@ -1153,36 +1096,6 @@
           </a:p>
         </p:txBody>
       </p:sp>
-      <p:pic>
-        <p:nvPicPr>
-          <p:cNvPr id="13" name="Image 0" descr="/home/claude/eo-framework-logo.png">
-            <a:extLst>
-              <a:ext uri="{FF2B5EF4-FFF2-40B4-BE49-F238E27FC236}">
-                <a16:creationId xmlns:a16="http://schemas.microsoft.com/office/drawing/2014/main" id="{25116040-BB88-891D-9118-628A78E99872}"/>
-              </a:ext>
-            </a:extLst>
-          </p:cNvPr>
-          <p:cNvPicPr>
-            <a:picLocks noChangeAspect="1"/>
-          </p:cNvPicPr>
-          <p:nvPr userDrawn="1"/>
-        </p:nvPicPr>
-        <p:blipFill>
-          <a:blip r:embed="rId2"/>
-          <a:stretch>
-            <a:fillRect/>
-          </a:stretch>
-        </p:blipFill>
-        <p:spPr>
-          <a:xfrm>
-            <a:off x="6945879" y="4648200"/>
-            <a:ext cx="1952244" cy="417576"/>
-          </a:xfrm>
-          <a:prstGeom prst="rect">
-            <a:avLst/>
-          </a:prstGeom>
-        </p:spPr>
-      </p:pic>
       <p:sp>
         <p:nvSpPr>
           <p:cNvPr id="4" name="Text Placeholder 3">
@@ -1244,6 +1157,48 @@
             <a:r>
               <a:rPr lang="en-US" dirty="0"/>
               <a:t>Bullet Point 2</a:t>
+            </a:r>
+          </a:p>
+        </p:txBody>
+      </p:sp>
+      <p:sp>
+        <p:nvSpPr>
+          <p:cNvPr id="5" name="Text Placeholder 4">
+            <a:extLst>
+              <a:ext uri="{FF2B5EF4-FFF2-40B4-BE49-F238E27FC236}">
+                <a16:creationId xmlns:a16="http://schemas.microsoft.com/office/drawing/2014/main" id="{162079A5-28FD-9D2F-2B9B-2FC8F9339A31}"/>
+              </a:ext>
+            </a:extLst>
+          </p:cNvPr>
+          <p:cNvSpPr>
+            <a:spLocks noGrp="1"/>
+          </p:cNvSpPr>
+          <p:nvPr>
+            <p:ph type="body" sz="quarter" idx="15" hasCustomPrompt="1"/>
+          </p:nvPr>
+        </p:nvSpPr>
+        <p:spPr>
+          <a:xfrm>
+            <a:off x="5627076" y="4738688"/>
+            <a:ext cx="3218473" cy="238125"/>
+          </a:xfrm>
+          <a:prstGeom prst="rect">
+            <a:avLst/>
+          </a:prstGeom>
+        </p:spPr>
+        <p:txBody>
+          <a:bodyPr/>
+          <a:lstStyle>
+            <a:lvl5pPr algn="r">
+              <a:buNone/>
+              <a:defRPr sz="1100"/>
+            </a:lvl5pPr>
+          </a:lstStyle>
+          <a:p>
+            <a:pPr lvl="4"/>
+            <a:r>
+              <a:rPr lang="en-US" dirty="0"/>
+              <a:t>Project Name</a:t>
             </a:r>
           </a:p>
         </p:txBody>
@@ -1372,36 +1327,6 @@
           </a:p>
         </p:txBody>
       </p:sp>
-      <p:pic>
-        <p:nvPicPr>
-          <p:cNvPr id="8" name="Image 0" descr="/home/claude/eo-framework-logo.png">
-            <a:extLst>
-              <a:ext uri="{FF2B5EF4-FFF2-40B4-BE49-F238E27FC236}">
-                <a16:creationId xmlns:a16="http://schemas.microsoft.com/office/drawing/2014/main" id="{4B7035C6-0EF1-6BD3-318E-553D1AAD6709}"/>
-              </a:ext>
-            </a:extLst>
-          </p:cNvPr>
-          <p:cNvPicPr>
-            <a:picLocks noChangeAspect="1"/>
-          </p:cNvPicPr>
-          <p:nvPr userDrawn="1"/>
-        </p:nvPicPr>
-        <p:blipFill>
-          <a:blip r:embed="rId2"/>
-          <a:stretch>
-            <a:fillRect/>
-          </a:stretch>
-        </p:blipFill>
-        <p:spPr>
-          <a:xfrm>
-            <a:off x="6945879" y="4648200"/>
-            <a:ext cx="1952244" cy="417576"/>
-          </a:xfrm>
-          <a:prstGeom prst="rect">
-            <a:avLst/>
-          </a:prstGeom>
-        </p:spPr>
-      </p:pic>
       <p:sp>
         <p:nvSpPr>
           <p:cNvPr id="10" name="Picture Placeholder 13">
@@ -1464,7 +1389,7 @@
           <a:bodyPr/>
           <a:lstStyle>
             <a:lvl1pPr>
-              <a:defRPr sz="1800">
+              <a:defRPr sz="1800" b="1">
                 <a:solidFill>
                   <a:srgbClr val="C00000"/>
                 </a:solidFill>
@@ -1549,7 +1474,7 @@
           <a:bodyPr/>
           <a:lstStyle>
             <a:lvl1pPr>
-              <a:defRPr sz="1800">
+              <a:defRPr sz="1800" b="1">
                 <a:solidFill>
                   <a:srgbClr val="C00000"/>
                 </a:solidFill>
@@ -1601,6 +1526,48 @@
             <a:r>
               <a:rPr lang="en-US" dirty="0"/>
               <a:t>Fifth level</a:t>
+            </a:r>
+          </a:p>
+        </p:txBody>
+      </p:sp>
+      <p:sp>
+        <p:nvSpPr>
+          <p:cNvPr id="4" name="Text Placeholder 4">
+            <a:extLst>
+              <a:ext uri="{FF2B5EF4-FFF2-40B4-BE49-F238E27FC236}">
+                <a16:creationId xmlns:a16="http://schemas.microsoft.com/office/drawing/2014/main" id="{5DF49ED0-89F0-F008-ADD7-D71F338C8B9B}"/>
+              </a:ext>
+            </a:extLst>
+          </p:cNvPr>
+          <p:cNvSpPr>
+            <a:spLocks noGrp="1"/>
+          </p:cNvSpPr>
+          <p:nvPr>
+            <p:ph type="body" sz="quarter" idx="15" hasCustomPrompt="1"/>
+          </p:nvPr>
+        </p:nvSpPr>
+        <p:spPr>
+          <a:xfrm>
+            <a:off x="5697414" y="4681864"/>
+            <a:ext cx="3218473" cy="238125"/>
+          </a:xfrm>
+          <a:prstGeom prst="rect">
+            <a:avLst/>
+          </a:prstGeom>
+        </p:spPr>
+        <p:txBody>
+          <a:bodyPr/>
+          <a:lstStyle>
+            <a:lvl5pPr algn="r">
+              <a:buNone/>
+              <a:defRPr sz="1100"/>
+            </a:lvl5pPr>
+          </a:lstStyle>
+          <a:p>
+            <a:pPr lvl="4"/>
+            <a:r>
+              <a:rPr lang="en-US" dirty="0"/>
+              <a:t>Project Name</a:t>
             </a:r>
           </a:p>
         </p:txBody>
@@ -1789,36 +1756,6 @@
           </a:p>
         </p:txBody>
       </p:sp>
-      <p:pic>
-        <p:nvPicPr>
-          <p:cNvPr id="13" name="Image 0" descr="/home/claude/eo-framework-logo.png">
-            <a:extLst>
-              <a:ext uri="{FF2B5EF4-FFF2-40B4-BE49-F238E27FC236}">
-                <a16:creationId xmlns:a16="http://schemas.microsoft.com/office/drawing/2014/main" id="{25116040-BB88-891D-9118-628A78E99872}"/>
-              </a:ext>
-            </a:extLst>
-          </p:cNvPr>
-          <p:cNvPicPr>
-            <a:picLocks noChangeAspect="1"/>
-          </p:cNvPicPr>
-          <p:nvPr userDrawn="1"/>
-        </p:nvPicPr>
-        <p:blipFill>
-          <a:blip r:embed="rId2"/>
-          <a:stretch>
-            <a:fillRect/>
-          </a:stretch>
-        </p:blipFill>
-        <p:spPr>
-          <a:xfrm>
-            <a:off x="6945879" y="4648200"/>
-            <a:ext cx="1952244" cy="417576"/>
-          </a:xfrm>
-          <a:prstGeom prst="rect">
-            <a:avLst/>
-          </a:prstGeom>
-        </p:spPr>
-      </p:pic>
       <p:sp>
         <p:nvSpPr>
           <p:cNvPr id="5" name="Table Placeholder 4">
@@ -1849,6 +1786,48 @@
           <a:lstStyle/>
           <a:p>
             <a:endParaRPr lang="en-US"/>
+          </a:p>
+        </p:txBody>
+      </p:sp>
+      <p:sp>
+        <p:nvSpPr>
+          <p:cNvPr id="4" name="Text Placeholder 4">
+            <a:extLst>
+              <a:ext uri="{FF2B5EF4-FFF2-40B4-BE49-F238E27FC236}">
+                <a16:creationId xmlns:a16="http://schemas.microsoft.com/office/drawing/2014/main" id="{A00DC936-676C-1BAA-B4B4-D45CC5951D6E}"/>
+              </a:ext>
+            </a:extLst>
+          </p:cNvPr>
+          <p:cNvSpPr>
+            <a:spLocks noGrp="1"/>
+          </p:cNvSpPr>
+          <p:nvPr>
+            <p:ph type="body" sz="quarter" idx="15" hasCustomPrompt="1"/>
+          </p:nvPr>
+        </p:nvSpPr>
+        <p:spPr>
+          <a:xfrm>
+            <a:off x="5749315" y="4681864"/>
+            <a:ext cx="3218473" cy="238125"/>
+          </a:xfrm>
+          <a:prstGeom prst="rect">
+            <a:avLst/>
+          </a:prstGeom>
+        </p:spPr>
+        <p:txBody>
+          <a:bodyPr/>
+          <a:lstStyle>
+            <a:lvl5pPr algn="r">
+              <a:buNone/>
+              <a:defRPr sz="1100"/>
+            </a:lvl5pPr>
+          </a:lstStyle>
+          <a:p>
+            <a:pPr lvl="4"/>
+            <a:r>
+              <a:rPr lang="en-US" dirty="0"/>
+              <a:t>Project Name</a:t>
+            </a:r>
           </a:p>
         </p:txBody>
       </p:sp>
@@ -1976,36 +1955,6 @@
           </a:p>
         </p:txBody>
       </p:sp>
-      <p:pic>
-        <p:nvPicPr>
-          <p:cNvPr id="8" name="Image 0" descr="/home/claude/eo-framework-logo.png">
-            <a:extLst>
-              <a:ext uri="{FF2B5EF4-FFF2-40B4-BE49-F238E27FC236}">
-                <a16:creationId xmlns:a16="http://schemas.microsoft.com/office/drawing/2014/main" id="{4B7035C6-0EF1-6BD3-318E-553D1AAD6709}"/>
-              </a:ext>
-            </a:extLst>
-          </p:cNvPr>
-          <p:cNvPicPr>
-            <a:picLocks noChangeAspect="1"/>
-          </p:cNvPicPr>
-          <p:nvPr userDrawn="1"/>
-        </p:nvPicPr>
-        <p:blipFill>
-          <a:blip r:embed="rId2"/>
-          <a:stretch>
-            <a:fillRect/>
-          </a:stretch>
-        </p:blipFill>
-        <p:spPr>
-          <a:xfrm>
-            <a:off x="6945879" y="4648200"/>
-            <a:ext cx="1952244" cy="417576"/>
-          </a:xfrm>
-          <a:prstGeom prst="rect">
-            <a:avLst/>
-          </a:prstGeom>
-        </p:spPr>
-      </p:pic>
       <p:sp>
         <p:nvSpPr>
           <p:cNvPr id="10" name="Picture Placeholder 13">
@@ -2101,7 +2050,7 @@
           <a:bodyPr/>
           <a:lstStyle>
             <a:lvl1pPr>
-              <a:defRPr sz="1800">
+              <a:defRPr sz="1800" b="1">
                 <a:solidFill>
                   <a:srgbClr val="C00000"/>
                 </a:solidFill>
@@ -2153,6 +2102,48 @@
             <a:r>
               <a:rPr lang="en-US" dirty="0"/>
               <a:t>Fifth level</a:t>
+            </a:r>
+          </a:p>
+        </p:txBody>
+      </p:sp>
+      <p:sp>
+        <p:nvSpPr>
+          <p:cNvPr id="2" name="Text Placeholder 4">
+            <a:extLst>
+              <a:ext uri="{FF2B5EF4-FFF2-40B4-BE49-F238E27FC236}">
+                <a16:creationId xmlns:a16="http://schemas.microsoft.com/office/drawing/2014/main" id="{6D03683B-7C4B-D474-74C5-EC53E3BB515B}"/>
+              </a:ext>
+            </a:extLst>
+          </p:cNvPr>
+          <p:cNvSpPr>
+            <a:spLocks noGrp="1"/>
+          </p:cNvSpPr>
+          <p:nvPr>
+            <p:ph type="body" sz="quarter" idx="17" hasCustomPrompt="1"/>
+          </p:nvPr>
+        </p:nvSpPr>
+        <p:spPr>
+          <a:xfrm>
+            <a:off x="5781065" y="4729530"/>
+            <a:ext cx="3218473" cy="238125"/>
+          </a:xfrm>
+          <a:prstGeom prst="rect">
+            <a:avLst/>
+          </a:prstGeom>
+        </p:spPr>
+        <p:txBody>
+          <a:bodyPr/>
+          <a:lstStyle>
+            <a:lvl5pPr algn="r">
+              <a:buNone/>
+              <a:defRPr sz="1100"/>
+            </a:lvl5pPr>
+          </a:lstStyle>
+          <a:p>
+            <a:pPr lvl="4"/>
+            <a:r>
+              <a:rPr lang="en-US" dirty="0"/>
+              <a:t>Project Name</a:t>
             </a:r>
           </a:p>
         </p:txBody>
@@ -2281,36 +2272,6 @@
           </a:p>
         </p:txBody>
       </p:sp>
-      <p:pic>
-        <p:nvPicPr>
-          <p:cNvPr id="8" name="Image 0" descr="/home/claude/eo-framework-logo.png">
-            <a:extLst>
-              <a:ext uri="{FF2B5EF4-FFF2-40B4-BE49-F238E27FC236}">
-                <a16:creationId xmlns:a16="http://schemas.microsoft.com/office/drawing/2014/main" id="{4B7035C6-0EF1-6BD3-318E-553D1AAD6709}"/>
-              </a:ext>
-            </a:extLst>
-          </p:cNvPr>
-          <p:cNvPicPr>
-            <a:picLocks noChangeAspect="1"/>
-          </p:cNvPicPr>
-          <p:nvPr userDrawn="1"/>
-        </p:nvPicPr>
-        <p:blipFill>
-          <a:blip r:embed="rId2"/>
-          <a:stretch>
-            <a:fillRect/>
-          </a:stretch>
-        </p:blipFill>
-        <p:spPr>
-          <a:xfrm>
-            <a:off x="6945879" y="4648200"/>
-            <a:ext cx="1952244" cy="417576"/>
-          </a:xfrm>
-          <a:prstGeom prst="rect">
-            <a:avLst/>
-          </a:prstGeom>
-        </p:spPr>
-      </p:pic>
       <p:sp>
         <p:nvSpPr>
           <p:cNvPr id="10" name="Picture Placeholder 13">
@@ -2406,7 +2367,7 @@
           <a:bodyPr/>
           <a:lstStyle>
             <a:lvl1pPr>
-              <a:defRPr sz="1800">
+              <a:defRPr sz="1800" b="1">
                 <a:solidFill>
                   <a:srgbClr val="C00000"/>
                 </a:solidFill>
@@ -2458,6 +2419,48 @@
             <a:r>
               <a:rPr lang="en-US" dirty="0"/>
               <a:t>Fifth level</a:t>
+            </a:r>
+          </a:p>
+        </p:txBody>
+      </p:sp>
+      <p:sp>
+        <p:nvSpPr>
+          <p:cNvPr id="4" name="Text Placeholder 4">
+            <a:extLst>
+              <a:ext uri="{FF2B5EF4-FFF2-40B4-BE49-F238E27FC236}">
+                <a16:creationId xmlns:a16="http://schemas.microsoft.com/office/drawing/2014/main" id="{A1231DFE-6A5A-950E-159E-9E1D3D45FD36}"/>
+              </a:ext>
+            </a:extLst>
+          </p:cNvPr>
+          <p:cNvSpPr>
+            <a:spLocks noGrp="1"/>
+          </p:cNvSpPr>
+          <p:nvPr>
+            <p:ph type="body" sz="quarter" idx="17" hasCustomPrompt="1"/>
+          </p:nvPr>
+        </p:nvSpPr>
+        <p:spPr>
+          <a:xfrm>
+            <a:off x="5679465" y="4681864"/>
+            <a:ext cx="3218473" cy="238125"/>
+          </a:xfrm>
+          <a:prstGeom prst="rect">
+            <a:avLst/>
+          </a:prstGeom>
+        </p:spPr>
+        <p:txBody>
+          <a:bodyPr/>
+          <a:lstStyle>
+            <a:lvl5pPr algn="r">
+              <a:buNone/>
+              <a:defRPr sz="900"/>
+            </a:lvl5pPr>
+          </a:lstStyle>
+          <a:p>
+            <a:pPr lvl="4"/>
+            <a:r>
+              <a:rPr lang="en-US" dirty="0"/>
+              <a:t>Project Name</a:t>
             </a:r>
           </a:p>
         </p:txBody>
@@ -3265,25 +3268,6 @@
         <p:nvPr/>
       </p:nvGrpSpPr>
       <p:grpSpPr/>
-      <p:pic>
-        <p:nvPicPr>
-          <p:cNvPr id="2" name="Picture Placeholder 1" descr="client_logo.png"/>
-          <p:cNvPicPr>
-            <a:picLocks noGrp="1" noChangeAspect="1"/>
-          </p:cNvPicPr>
-          <p:nvPr>
-            <p:ph type="pic" idx="10" sz="quarter"/>
-          </p:nvPr>
-        </p:nvPicPr>
-        <p:blipFill>
-          <a:blip r:embed="rId2"/>
-          <a:srcRect t="433" b="433"/>
-          <a:stretch>
-            <a:fillRect/>
-          </a:stretch>
-        </p:blipFill>
-        <p:spPr/>
-      </p:pic>
       <p:sp>
         <p:nvSpPr>
           <p:cNvPr id="3" name="Text Placeholder 2"/>
@@ -3305,25 +3289,6 @@
           </a:p>
         </p:txBody>
       </p:sp>
-      <p:pic>
-        <p:nvPicPr>
-          <p:cNvPr id="4" name="Picture Placeholder 3" descr="consulting_company_logo.png"/>
-          <p:cNvPicPr>
-            <a:picLocks noGrp="1" noChangeAspect="1"/>
-          </p:cNvPicPr>
-          <p:nvPr>
-            <p:ph type="pic" idx="13" sz="quarter"/>
-          </p:nvPr>
-        </p:nvPicPr>
-        <p:blipFill>
-          <a:blip r:embed="rId3"/>
-          <a:srcRect t="5856" b="5856"/>
-          <a:stretch>
-            <a:fillRect/>
-          </a:stretch>
-        </p:blipFill>
-        <p:spPr/>
-      </p:pic>
       <p:sp>
         <p:nvSpPr>
           <p:cNvPr id="5" name="Text Placeholder 4"/>
@@ -3361,14 +3326,62 @@
           <a:lstStyle/>
           <a:p>
             <a:r>
-              <a:t>Alison Smith | November 18, 2025</a:t>
+              <a:t>Alison Smith | November 22, 2025</a:t>
             </a:r>
           </a:p>
         </p:txBody>
       </p:sp>
       <p:pic>
         <p:nvPicPr>
-          <p:cNvPr id="7" name="Picture 6" descr="eo-framework-logo-real.png"/>
+          <p:cNvPr id="7" name="Picture 6" descr="client_logo.png"/>
+          <p:cNvPicPr>
+            <a:picLocks noChangeAspect="1"/>
+          </p:cNvPicPr>
+          <p:nvPr/>
+        </p:nvPicPr>
+        <p:blipFill>
+          <a:blip r:embed="rId2"/>
+          <a:stretch>
+            <a:fillRect/>
+          </a:stretch>
+        </p:blipFill>
+        <p:spPr>
+          <a:xfrm>
+            <a:off x="2180492" y="171206"/>
+            <a:ext cx="3978520" cy="1314694"/>
+          </a:xfrm>
+          <a:prstGeom prst="rect">
+            <a:avLst/>
+          </a:prstGeom>
+        </p:spPr>
+      </p:pic>
+      <p:pic>
+        <p:nvPicPr>
+          <p:cNvPr id="8" name="Picture 7" descr="consulting_company_logo.png"/>
+          <p:cNvPicPr>
+            <a:picLocks noChangeAspect="1"/>
+          </p:cNvPicPr>
+          <p:nvPr/>
+        </p:nvPicPr>
+        <p:blipFill>
+          <a:blip r:embed="rId3"/>
+          <a:stretch>
+            <a:fillRect/>
+          </a:stretch>
+        </p:blipFill>
+        <p:spPr>
+          <a:xfrm>
+            <a:off x="313591" y="4536078"/>
+            <a:ext cx="2099897" cy="529698"/>
+          </a:xfrm>
+          <a:prstGeom prst="rect">
+            <a:avLst/>
+          </a:prstGeom>
+        </p:spPr>
+      </p:pic>
+      <p:pic>
+        <p:nvPicPr>
+          <p:cNvPr id="9" name="Picture 8" descr="eo-framework-logo-real.png"/>
           <p:cNvPicPr>
             <a:picLocks noChangeAspect="1"/>
           </p:cNvPicPr>
@@ -3423,31 +3436,13 @@
           <a:bodyPr/>
           <a:lstStyle/>
           <a:p>
+            <a:pPr algn="l"/>
             <a:r>
               <a:t>Next Steps</a:t>
             </a:r>
           </a:p>
         </p:txBody>
       </p:sp>
-      <p:pic>
-        <p:nvPicPr>
-          <p:cNvPr id="3" name="Picture Placeholder 2" descr="consulting_company_logo.png"/>
-          <p:cNvPicPr>
-            <a:picLocks noGrp="1" noChangeAspect="1"/>
-          </p:cNvPicPr>
-          <p:nvPr>
-            <p:ph type="pic" idx="13" sz="quarter"/>
-          </p:nvPr>
-        </p:nvPicPr>
-        <p:blipFill>
-          <a:blip r:embed="rId2"/>
-          <a:srcRect t="6762" b="6762"/>
-          <a:stretch>
-            <a:fillRect/>
-          </a:stretch>
-        </p:blipFill>
-        <p:spPr/>
-      </p:pic>
       <p:sp>
         <p:nvSpPr>
           <p:cNvPr id="4" name="Text Placeholder 3"/>
@@ -3469,7 +3464,7 @@
               <a:t>Decision:</a:t>
             </a:r>
             <a:r>
-              <a:t> Security team approval and executive sign-off by [date]</a:t>
+              <a:t> Security team approval and executive sign-off by [Target Date]</a:t>
             </a:r>
           </a:p>
           <a:p>
@@ -3479,7 +3474,7 @@
               <a:t>Kickoff:</a:t>
             </a:r>
             <a:r>
-              <a:t> Target start date for discovery phase</a:t>
+              <a:t> Project start scheduled for [Start Date] with security and IT teams engaged</a:t>
             </a:r>
           </a:p>
           <a:p>
@@ -3489,69 +3484,78 @@
               <a:t>Team Formation:</a:t>
             </a:r>
             <a:r>
-              <a:t> Security operations lead, IT infrastructure SMEs, compliance officer</a:t>
+              <a:t> Security operations lead, IT infrastructure SMEs, and compliance officer designated</a:t>
             </a:r>
           </a:p>
           <a:p>
             <a:pPr/>
             <a:r>
               <a:rPr b="1"/>
-              <a:t>Week 1:</a:t>
-            </a:r>
-            <a:r>
-              <a:t> Contract finalization and Azure environment access setup</a:t>
+              <a:t>Week 1-2:</a:t>
+            </a:r>
+            <a:r>
+              <a:t> Contract finalization, Azure environment access setup, and discovery workshops</a:t>
             </a:r>
           </a:p>
           <a:p>
             <a:pPr/>
             <a:r>
               <a:rPr b="1"/>
-              <a:t>Week 2:</a:t>
-            </a:r>
-            <a:r>
-              <a:t> Discovery workshops with security and IT teams</a:t>
-            </a:r>
-          </a:p>
-          <a:p>
-            <a:pPr/>
-            <a:r>
-              <a:rPr b="1"/>
-              <a:t>Week 3:</a:t>
-            </a:r>
-            <a:r>
-              <a:t> Log Analytics Workspace deployment and initial data connector testing</a:t>
-            </a:r>
-          </a:p>
-          <a:p>
-            <a:pPr/>
-            <a:r>
-              <a:rPr b="1"/>
-              <a:t>Week 4:</a:t>
-            </a:r>
-            <a:r>
-              <a:t> First critical systems connected and generating security alerts</a:t>
+              <a:t>Week 3-4:</a:t>
+            </a:r>
+            <a:r>
+              <a:t> Log Analytics Workspace deployment and first critical systems generating alerts</a:t>
+            </a:r>
+          </a:p>
+        </p:txBody>
+      </p:sp>
+      <p:sp>
+        <p:nvSpPr>
+          <p:cNvPr id="5" name="Text Placeholder 4"/>
+          <p:cNvSpPr>
+            <a:spLocks noGrp="1"/>
+          </p:cNvSpPr>
+          <p:nvPr>
+            <p:ph type="body" idx="15" sz="quarter"/>
+          </p:nvPr>
+        </p:nvSpPr>
+        <p:spPr/>
+        <p:txBody>
+          <a:bodyPr/>
+          <a:lstStyle/>
+          <a:p>
+            <a:pPr algn="r">
+              <a:buNone/>
+            </a:pPr>
+            <a:r>
+              <a:rPr sz="1100">
+                <a:solidFill>
+                  <a:srgbClr val="CC0000"/>
+                </a:solidFill>
+              </a:rPr>
+              <a:t>Microsoft Sentinel SIEM Implementation</a:t>
             </a:r>
           </a:p>
         </p:txBody>
       </p:sp>
       <p:pic>
         <p:nvPicPr>
-          <p:cNvPr id="5" name="Picture 4" descr="eo-framework-logo-real.png"/>
+          <p:cNvPr id="6" name="Picture 5" descr="consulting_company_logo.png"/>
           <p:cNvPicPr>
             <a:picLocks noChangeAspect="1"/>
           </p:cNvPicPr>
           <p:nvPr/>
         </p:nvPicPr>
         <p:blipFill>
-          <a:blip r:embed="rId3"/>
+          <a:blip r:embed="rId2"/>
           <a:stretch>
             <a:fillRect/>
           </a:stretch>
         </p:blipFill>
         <p:spPr>
           <a:xfrm>
-            <a:off x="6684264" y="4535424"/>
-            <a:ext cx="2139696" cy="530352"/>
+            <a:off x="313593" y="4536078"/>
+            <a:ext cx="2143858" cy="529698"/>
           </a:xfrm>
           <a:prstGeom prst="rect">
             <a:avLst/>
@@ -3576,25 +3580,6 @@
         <p:nvPr/>
       </p:nvGrpSpPr>
       <p:grpSpPr/>
-      <p:pic>
-        <p:nvPicPr>
-          <p:cNvPr id="2" name="Picture Placeholder 1" descr="client_logo.png"/>
-          <p:cNvPicPr>
-            <a:picLocks noGrp="1" noChangeAspect="1"/>
-          </p:cNvPicPr>
-          <p:nvPr>
-            <p:ph type="pic" idx="10" sz="quarter"/>
-          </p:nvPr>
-        </p:nvPicPr>
-        <p:blipFill>
-          <a:blip r:embed="rId2"/>
-          <a:srcRect t="433" b="433"/>
-          <a:stretch>
-            <a:fillRect/>
-          </a:stretch>
-        </p:blipFill>
-        <p:spPr/>
-      </p:pic>
       <p:sp>
         <p:nvSpPr>
           <p:cNvPr id="3" name="Text Placeholder 2"/>
@@ -3616,25 +3601,6 @@
           </a:p>
         </p:txBody>
       </p:sp>
-      <p:pic>
-        <p:nvPicPr>
-          <p:cNvPr id="4" name="Picture Placeholder 3" descr="consulting_company_logo.png"/>
-          <p:cNvPicPr>
-            <a:picLocks noGrp="1" noChangeAspect="1"/>
-          </p:cNvPicPr>
-          <p:nvPr>
-            <p:ph type="pic" idx="13" sz="quarter"/>
-          </p:nvPr>
-        </p:nvPicPr>
-        <p:blipFill>
-          <a:blip r:embed="rId3"/>
-          <a:srcRect t="7166" b="7166"/>
-          <a:stretch>
-            <a:fillRect/>
-          </a:stretch>
-        </p:blipFill>
-        <p:spPr/>
-      </p:pic>
       <p:sp>
         <p:nvSpPr>
           <p:cNvPr id="5" name="Text Placeholder 4"/>
@@ -3666,21 +3632,60 @@
         <p:txBody>
           <a:bodyPr/>
           <a:lstStyle/>
-          <a:p>
-            <a:pPr/>
-            <a:r>
-              <a:rPr b="1"/>
-              <a:t>Your Account Manager:</a:t>
-            </a:r>
-            <a:r>
-              <a:t> [Name, Title] | [Email] | [Phone]</a:t>
-            </a:r>
-          </a:p>
+          <a:p/>
         </p:txBody>
       </p:sp>
       <p:pic>
         <p:nvPicPr>
-          <p:cNvPr id="7" name="Picture 6" descr="eo-framework-logo-real.png"/>
+          <p:cNvPr id="7" name="Picture 6" descr="client_logo.png"/>
+          <p:cNvPicPr>
+            <a:picLocks noChangeAspect="1"/>
+          </p:cNvPicPr>
+          <p:nvPr/>
+        </p:nvPicPr>
+        <p:blipFill>
+          <a:blip r:embed="rId2"/>
+          <a:stretch>
+            <a:fillRect/>
+          </a:stretch>
+        </p:blipFill>
+        <p:spPr>
+          <a:xfrm>
+            <a:off x="2180492" y="171206"/>
+            <a:ext cx="3978520" cy="1314694"/>
+          </a:xfrm>
+          <a:prstGeom prst="rect">
+            <a:avLst/>
+          </a:prstGeom>
+        </p:spPr>
+      </p:pic>
+      <p:pic>
+        <p:nvPicPr>
+          <p:cNvPr id="8" name="Picture 7" descr="consulting_company_logo.png"/>
+          <p:cNvPicPr>
+            <a:picLocks noChangeAspect="1"/>
+          </p:cNvPicPr>
+          <p:nvPr/>
+        </p:nvPicPr>
+        <p:blipFill>
+          <a:blip r:embed="rId3"/>
+          <a:stretch>
+            <a:fillRect/>
+          </a:stretch>
+        </p:blipFill>
+        <p:spPr>
+          <a:xfrm>
+            <a:off x="313592" y="4536078"/>
+            <a:ext cx="2164114" cy="529698"/>
+          </a:xfrm>
+          <a:prstGeom prst="rect">
+            <a:avLst/>
+          </a:prstGeom>
+        </p:spPr>
+      </p:pic>
+      <p:pic>
+        <p:nvPicPr>
+          <p:cNvPr id="9" name="Picture 8" descr="eo-framework-logo-real.png"/>
           <p:cNvPicPr>
             <a:picLocks noChangeAspect="1"/>
           </p:cNvPicPr>
@@ -3735,31 +3740,13 @@
           <a:bodyPr/>
           <a:lstStyle/>
           <a:p>
+            <a:pPr algn="l"/>
             <a:r>
               <a:t>Business Opportunity</a:t>
             </a:r>
           </a:p>
         </p:txBody>
       </p:sp>
-      <p:pic>
-        <p:nvPicPr>
-          <p:cNvPr id="3" name="Picture Placeholder 2" descr="consulting_company_logo.png"/>
-          <p:cNvPicPr>
-            <a:picLocks noGrp="1" noChangeAspect="1"/>
-          </p:cNvPicPr>
-          <p:nvPr>
-            <p:ph type="pic" idx="14" sz="quarter"/>
-          </p:nvPr>
-        </p:nvPicPr>
-        <p:blipFill>
-          <a:blip r:embed="rId2"/>
-          <a:srcRect t="6314" b="6314"/>
-          <a:stretch>
-            <a:fillRect/>
-          </a:stretch>
-        </p:blipFill>
-        <p:spPr/>
-      </p:pic>
       <p:sp>
         <p:nvSpPr>
           <p:cNvPr id="4" name="Text Placeholder 3"/>
@@ -3842,24 +3829,53 @@
           </a:p>
         </p:txBody>
       </p:sp>
+      <p:sp>
+        <p:nvSpPr>
+          <p:cNvPr id="6" name="Text Placeholder 5"/>
+          <p:cNvSpPr>
+            <a:spLocks noGrp="1"/>
+          </p:cNvSpPr>
+          <p:nvPr>
+            <p:ph type="body" idx="15" sz="quarter"/>
+          </p:nvPr>
+        </p:nvSpPr>
+        <p:spPr/>
+        <p:txBody>
+          <a:bodyPr/>
+          <a:lstStyle/>
+          <a:p>
+            <a:pPr algn="r">
+              <a:buNone/>
+            </a:pPr>
+            <a:r>
+              <a:rPr sz="1100">
+                <a:solidFill>
+                  <a:srgbClr val="CC0000"/>
+                </a:solidFill>
+              </a:rPr>
+              <a:t>Microsoft Sentinel SIEM Implementation</a:t>
+            </a:r>
+          </a:p>
+        </p:txBody>
+      </p:sp>
       <p:pic>
         <p:nvPicPr>
-          <p:cNvPr id="6" name="Picture 5" descr="eo-framework-logo-real.png"/>
+          <p:cNvPr id="7" name="Picture 6" descr="consulting_company_logo.png"/>
           <p:cNvPicPr>
             <a:picLocks noChangeAspect="1"/>
           </p:cNvPicPr>
           <p:nvPr/>
         </p:nvPicPr>
         <p:blipFill>
-          <a:blip r:embed="rId3"/>
+          <a:blip r:embed="rId2"/>
           <a:stretch>
             <a:fillRect/>
           </a:stretch>
         </p:blipFill>
         <p:spPr>
           <a:xfrm>
-            <a:off x="6684264" y="4535424"/>
-            <a:ext cx="2139696" cy="530352"/>
+            <a:off x="313592" y="4536078"/>
+            <a:ext cx="2121877" cy="529698"/>
           </a:xfrm>
           <a:prstGeom prst="rect">
             <a:avLst/>
@@ -3901,31 +3917,11 @@
           <a:p>
             <a:pPr algn="l"/>
             <a:r>
-              <a:rPr b="1"/>
               <a:t>Engagement Scope</a:t>
             </a:r>
           </a:p>
         </p:txBody>
       </p:sp>
-      <p:pic>
-        <p:nvPicPr>
-          <p:cNvPr id="3" name="Picture Placeholder 2" descr="consulting_company_logo.png"/>
-          <p:cNvPicPr>
-            <a:picLocks noGrp="1" noChangeAspect="1"/>
-          </p:cNvPicPr>
-          <p:nvPr>
-            <p:ph type="pic" idx="13" sz="quarter"/>
-          </p:nvPr>
-        </p:nvPicPr>
-        <p:blipFill>
-          <a:blip r:embed="rId2"/>
-          <a:srcRect t="6404" b="6404"/>
-          <a:stretch>
-            <a:fillRect/>
-          </a:stretch>
-        </p:blipFill>
-        <p:spPr/>
-      </p:pic>
       <p:graphicFrame>
         <p:nvGraphicFramePr>
           <p:cNvPr id="4" name="Table Placeholder 3"/>
@@ -4006,11 +4002,6 @@
                     <a:solidFill>
                       <a:srgbClr val="FFFFFF"/>
                     </a:solidFill>
-                    <a:lnL w="12700">
-                      <a:solidFill>
-                        <a:srgbClr val="D0D0D0"/>
-                      </a:solidFill>
-                    </a:lnL>
                   </a:tcPr>
                 </a:tc>
                 <a:tc>
@@ -4101,11 +4092,580 @@
                     <a:solidFill>
                       <a:srgbClr val="FFFFFF"/>
                     </a:solidFill>
-                    <a:lnL w="12700">
-                      <a:solidFill>
-                        <a:srgbClr val="D0D0D0"/>
-                      </a:solidFill>
-                    </a:lnL>
+                  </a:tcPr>
+                </a:tc>
+                <a:tc>
+                  <a:txBody>
+                    <a:bodyPr/>
+                    <a:lstStyle/>
+                    <a:p>
+                      <a:r>
+                        <a:rPr b="1" sz="1100"/>
+                        <a:t>Availability Requirements</a:t>
+                      </a:r>
+                    </a:p>
+                  </a:txBody>
+                  <a:tcPr>
+                    <a:solidFill>
+                      <a:srgbClr val="E7E6E6"/>
+                    </a:solidFill>
+                  </a:tcPr>
+                </a:tc>
+                <a:tc>
+                  <a:txBody>
+                    <a:bodyPr/>
+                    <a:lstStyle/>
+                    <a:p>
+                      <a:r>
+                        <a:rPr sz="1100"/>
+                        <a:t>24/7 monitoring</a:t>
+                      </a:r>
+                    </a:p>
+                  </a:txBody>
+                  <a:tcPr>
+                    <a:solidFill>
+                      <a:srgbClr val="E7E6E6"/>
+                    </a:solidFill>
+                  </a:tcPr>
+                </a:tc>
+              </a:tr>
+              <a:tr h="370840">
+                <a:tc>
+                  <a:txBody>
+                    <a:bodyPr/>
+                    <a:lstStyle/>
+                    <a:p>
+                      <a:r>
+                        <a:rPr b="1" sz="1100"/>
+                        <a:t>Analytics Rules</a:t>
+                      </a:r>
+                    </a:p>
+                  </a:txBody>
+                  <a:tcPr>
+                    <a:solidFill>
+                      <a:srgbClr val="E7E6E6"/>
+                    </a:solidFill>
+                  </a:tcPr>
+                </a:tc>
+                <a:tc>
+                  <a:txBody>
+                    <a:bodyPr/>
+                    <a:lstStyle/>
+                    <a:p>
+                      <a:r>
+                        <a:rPr sz="1100"/>
+                        <a:t>50 custom detection rules</a:t>
+                      </a:r>
+                    </a:p>
+                  </a:txBody>
+                  <a:tcPr>
+                    <a:solidFill>
+                      <a:srgbClr val="E7E6E6"/>
+                    </a:solidFill>
+                  </a:tcPr>
+                </a:tc>
+                <a:tc>
+                  <a:txBody>
+                    <a:bodyPr/>
+                    <a:lstStyle/>
+                    <a:p/>
+                  </a:txBody>
+                  <a:tcPr>
+                    <a:solidFill>
+                      <a:srgbClr val="FFFFFF"/>
+                    </a:solidFill>
+                  </a:tcPr>
+                </a:tc>
+                <a:tc>
+                  <a:txBody>
+                    <a:bodyPr/>
+                    <a:lstStyle/>
+                    <a:p>
+                      <a:r>
+                        <a:rPr b="1" sz="1100"/>
+                        <a:t>Infrastructure Complexity</a:t>
+                      </a:r>
+                    </a:p>
+                  </a:txBody>
+                  <a:tcPr>
+                    <a:solidFill>
+                      <a:srgbClr val="E7E6E6"/>
+                    </a:solidFill>
+                  </a:tcPr>
+                </a:tc>
+                <a:tc>
+                  <a:txBody>
+                    <a:bodyPr/>
+                    <a:lstStyle/>
+                    <a:p>
+                      <a:r>
+                        <a:rPr sz="1100"/>
+                        <a:t>Log Analytics + Sentinel workspace</a:t>
+                      </a:r>
+                    </a:p>
+                  </a:txBody>
+                  <a:tcPr>
+                    <a:solidFill>
+                      <a:srgbClr val="E7E6E6"/>
+                    </a:solidFill>
+                  </a:tcPr>
+                </a:tc>
+              </a:tr>
+              <a:tr h="370840">
+                <a:tc>
+                  <a:txBody>
+                    <a:bodyPr/>
+                    <a:lstStyle/>
+                    <a:p>
+                      <a:r>
+                        <a:rPr b="1" sz="1100"/>
+                        <a:t>Log Sources</a:t>
+                      </a:r>
+                    </a:p>
+                  </a:txBody>
+                  <a:tcPr>
+                    <a:solidFill>
+                      <a:srgbClr val="E7E6E6"/>
+                    </a:solidFill>
+                  </a:tcPr>
+                </a:tc>
+                <a:tc>
+                  <a:txBody>
+                    <a:bodyPr/>
+                    <a:lstStyle/>
+                    <a:p>
+                      <a:r>
+                        <a:rPr sz="1100"/>
+                        <a:t>Azure AD Office365 Firewall Endpoints</a:t>
+                      </a:r>
+                    </a:p>
+                  </a:txBody>
+                  <a:tcPr>
+                    <a:solidFill>
+                      <a:srgbClr val="E7E6E6"/>
+                    </a:solidFill>
+                  </a:tcPr>
+                </a:tc>
+                <a:tc>
+                  <a:txBody>
+                    <a:bodyPr/>
+                    <a:lstStyle/>
+                    <a:p/>
+                  </a:txBody>
+                  <a:tcPr>
+                    <a:solidFill>
+                      <a:srgbClr val="FFFFFF"/>
+                    </a:solidFill>
+                  </a:tcPr>
+                </a:tc>
+                <a:tc>
+                  <a:txBody>
+                    <a:bodyPr/>
+                    <a:lstStyle/>
+                    <a:p>
+                      <a:r>
+                        <a:rPr b="1" sz="1100"/>
+                        <a:t>Security Requirements</a:t>
+                      </a:r>
+                    </a:p>
+                  </a:txBody>
+                  <a:tcPr>
+                    <a:solidFill>
+                      <a:srgbClr val="E7E6E6"/>
+                    </a:solidFill>
+                  </a:tcPr>
+                </a:tc>
+                <a:tc>
+                  <a:txBody>
+                    <a:bodyPr/>
+                    <a:lstStyle/>
+                    <a:p>
+                      <a:r>
+                        <a:rPr sz="1100"/>
+                        <a:t>RBAC MFA audit logging</a:t>
+                      </a:r>
+                    </a:p>
+                  </a:txBody>
+                  <a:tcPr>
+                    <a:solidFill>
+                      <a:srgbClr val="E7E6E6"/>
+                    </a:solidFill>
+                  </a:tcPr>
+                </a:tc>
+              </a:tr>
+              <a:tr h="370840">
+                <a:tc>
+                  <a:txBody>
+                    <a:bodyPr/>
+                    <a:lstStyle/>
+                    <a:p>
+                      <a:r>
+                        <a:rPr b="1" sz="1100"/>
+                        <a:t>SOAR Playbooks</a:t>
+                      </a:r>
+                    </a:p>
+                  </a:txBody>
+                  <a:tcPr>
+                    <a:solidFill>
+                      <a:srgbClr val="E7E6E6"/>
+                    </a:solidFill>
+                  </a:tcPr>
+                </a:tc>
+                <a:tc>
+                  <a:txBody>
+                    <a:bodyPr/>
+                    <a:lstStyle/>
+                    <a:p>
+                      <a:r>
+                        <a:rPr sz="1100"/>
+                        <a:t>10 automated playbooks</a:t>
+                      </a:r>
+                    </a:p>
+                  </a:txBody>
+                  <a:tcPr>
+                    <a:solidFill>
+                      <a:srgbClr val="E7E6E6"/>
+                    </a:solidFill>
+                  </a:tcPr>
+                </a:tc>
+                <a:tc>
+                  <a:txBody>
+                    <a:bodyPr/>
+                    <a:lstStyle/>
+                    <a:p/>
+                  </a:txBody>
+                  <a:tcPr>
+                    <a:solidFill>
+                      <a:srgbClr val="FFFFFF"/>
+                    </a:solidFill>
+                  </a:tcPr>
+                </a:tc>
+                <a:tc>
+                  <a:txBody>
+                    <a:bodyPr/>
+                    <a:lstStyle/>
+                    <a:p>
+                      <a:r>
+                        <a:rPr b="1" sz="1100"/>
+                        <a:t>Compliance Frameworks</a:t>
+                      </a:r>
+                    </a:p>
+                  </a:txBody>
+                  <a:tcPr>
+                    <a:solidFill>
+                      <a:srgbClr val="E7E6E6"/>
+                    </a:solidFill>
+                  </a:tcPr>
+                </a:tc>
+                <a:tc>
+                  <a:txBody>
+                    <a:bodyPr/>
+                    <a:lstStyle/>
+                    <a:p>
+                      <a:r>
+                        <a:rPr sz="1100"/>
+                        <a:t>SOC2 NIST CSF</a:t>
+                      </a:r>
+                    </a:p>
+                  </a:txBody>
+                  <a:tcPr>
+                    <a:solidFill>
+                      <a:srgbClr val="E7E6E6"/>
+                    </a:solidFill>
+                  </a:tcPr>
+                </a:tc>
+              </a:tr>
+              <a:tr h="370840">
+                <a:tc>
+                  <a:txBody>
+                    <a:bodyPr/>
+                    <a:lstStyle/>
+                    <a:p>
+                      <a:r>
+                        <a:rPr b="1" sz="1100"/>
+                        <a:t>Total Users</a:t>
+                      </a:r>
+                    </a:p>
+                  </a:txBody>
+                  <a:tcPr>
+                    <a:solidFill>
+                      <a:srgbClr val="E7E6E6"/>
+                    </a:solidFill>
+                  </a:tcPr>
+                </a:tc>
+                <a:tc>
+                  <a:txBody>
+                    <a:bodyPr/>
+                    <a:lstStyle/>
+                    <a:p>
+                      <a:r>
+                        <a:rPr sz="1100"/>
+                        <a:t>10 SOC analysts</a:t>
+                      </a:r>
+                    </a:p>
+                  </a:txBody>
+                  <a:tcPr>
+                    <a:solidFill>
+                      <a:srgbClr val="E7E6E6"/>
+                    </a:solidFill>
+                  </a:tcPr>
+                </a:tc>
+                <a:tc>
+                  <a:txBody>
+                    <a:bodyPr/>
+                    <a:lstStyle/>
+                    <a:p/>
+                  </a:txBody>
+                  <a:tcPr>
+                    <a:solidFill>
+                      <a:srgbClr val="FFFFFF"/>
+                    </a:solidFill>
+                  </a:tcPr>
+                </a:tc>
+                <a:tc>
+                  <a:txBody>
+                    <a:bodyPr/>
+                    <a:lstStyle/>
+                    <a:p>
+                      <a:r>
+                        <a:rPr b="1" sz="1100"/>
+                        <a:t>Detection Response</a:t>
+                      </a:r>
+                    </a:p>
+                  </a:txBody>
+                  <a:tcPr>
+                    <a:solidFill>
+                      <a:srgbClr val="E7E6E6"/>
+                    </a:solidFill>
+                  </a:tcPr>
+                </a:tc>
+                <a:tc>
+                  <a:txBody>
+                    <a:bodyPr/>
+                    <a:lstStyle/>
+                    <a:p>
+                      <a:r>
+                        <a:rPr sz="1100"/>
+                        <a:t>MTTR &lt;1 hour</a:t>
+                      </a:r>
+                    </a:p>
+                  </a:txBody>
+                  <a:tcPr>
+                    <a:solidFill>
+                      <a:srgbClr val="E7E6E6"/>
+                    </a:solidFill>
+                  </a:tcPr>
+                </a:tc>
+              </a:tr>
+              <a:tr h="370840">
+                <a:tc>
+                  <a:txBody>
+                    <a:bodyPr/>
+                    <a:lstStyle/>
+                    <a:p>
+                      <a:r>
+                        <a:rPr b="1" sz="1100"/>
+                        <a:t>User Roles</a:t>
+                      </a:r>
+                    </a:p>
+                  </a:txBody>
+                  <a:tcPr>
+                    <a:solidFill>
+                      <a:srgbClr val="E7E6E6"/>
+                    </a:solidFill>
+                  </a:tcPr>
+                </a:tc>
+                <a:tc>
+                  <a:txBody>
+                    <a:bodyPr/>
+                    <a:lstStyle/>
+                    <a:p>
+                      <a:r>
+                        <a:rPr sz="1100"/>
+                        <a:t>3 roles (analyst engineer admin)</a:t>
+                      </a:r>
+                    </a:p>
+                  </a:txBody>
+                  <a:tcPr>
+                    <a:solidFill>
+                      <a:srgbClr val="E7E6E6"/>
+                    </a:solidFill>
+                  </a:tcPr>
+                </a:tc>
+                <a:tc>
+                  <a:txBody>
+                    <a:bodyPr/>
+                    <a:lstStyle/>
+                    <a:p/>
+                  </a:txBody>
+                  <a:tcPr>
+                    <a:solidFill>
+                      <a:srgbClr val="FFFFFF"/>
+                    </a:solidFill>
+                  </a:tcPr>
+                </a:tc>
+                <a:tc>
+                  <a:txBody>
+                    <a:bodyPr/>
+                    <a:lstStyle/>
+                    <a:p>
+                      <a:r>
+                        <a:rPr b="1" sz="1100"/>
+                        <a:t>Query Performance</a:t>
+                      </a:r>
+                    </a:p>
+                  </a:txBody>
+                  <a:tcPr>
+                    <a:solidFill>
+                      <a:srgbClr val="E7E6E6"/>
+                    </a:solidFill>
+                  </a:tcPr>
+                </a:tc>
+                <a:tc>
+                  <a:txBody>
+                    <a:bodyPr/>
+                    <a:lstStyle/>
+                    <a:p>
+                      <a:r>
+                        <a:rPr sz="1100"/>
+                        <a:t>Standard KQL queries</a:t>
+                      </a:r>
+                    </a:p>
+                  </a:txBody>
+                  <a:tcPr>
+                    <a:solidFill>
+                      <a:srgbClr val="E7E6E6"/>
+                    </a:solidFill>
+                  </a:tcPr>
+                </a:tc>
+              </a:tr>
+              <a:tr h="370840">
+                <a:tc>
+                  <a:txBody>
+                    <a:bodyPr/>
+                    <a:lstStyle/>
+                    <a:p>
+                      <a:r>
+                        <a:rPr b="1" sz="1100"/>
+                        <a:t>Daily Log Ingestion</a:t>
+                      </a:r>
+                    </a:p>
+                  </a:txBody>
+                  <a:tcPr>
+                    <a:solidFill>
+                      <a:srgbClr val="E7E6E6"/>
+                    </a:solidFill>
+                  </a:tcPr>
+                </a:tc>
+                <a:tc>
+                  <a:txBody>
+                    <a:bodyPr/>
+                    <a:lstStyle/>
+                    <a:p>
+                      <a:r>
+                        <a:rPr sz="1100"/>
+                        <a:t>50 GB/day</a:t>
+                      </a:r>
+                    </a:p>
+                  </a:txBody>
+                  <a:tcPr>
+                    <a:solidFill>
+                      <a:srgbClr val="E7E6E6"/>
+                    </a:solidFill>
+                  </a:tcPr>
+                </a:tc>
+                <a:tc>
+                  <a:txBody>
+                    <a:bodyPr/>
+                    <a:lstStyle/>
+                    <a:p/>
+                  </a:txBody>
+                  <a:tcPr>
+                    <a:solidFill>
+                      <a:srgbClr val="FFFFFF"/>
+                    </a:solidFill>
+                  </a:tcPr>
+                </a:tc>
+                <a:tc>
+                  <a:txBody>
+                    <a:bodyPr/>
+                    <a:lstStyle/>
+                    <a:p>
+                      <a:r>
+                        <a:rPr b="1" sz="1100"/>
+                        <a:t>Deployment Environments</a:t>
+                      </a:r>
+                    </a:p>
+                  </a:txBody>
+                  <a:tcPr>
+                    <a:solidFill>
+                      <a:srgbClr val="E7E6E6"/>
+                    </a:solidFill>
+                  </a:tcPr>
+                </a:tc>
+                <a:tc>
+                  <a:txBody>
+                    <a:bodyPr/>
+                    <a:lstStyle/>
+                    <a:p>
+                      <a:r>
+                        <a:rPr sz="1100"/>
+                        <a:t>2 environments (dev prod)</a:t>
+                      </a:r>
+                    </a:p>
+                  </a:txBody>
+                  <a:tcPr>
+                    <a:solidFill>
+                      <a:srgbClr val="E7E6E6"/>
+                    </a:solidFill>
+                  </a:tcPr>
+                </a:tc>
+              </a:tr>
+              <a:tr h="370840">
+                <a:tc>
+                  <a:txBody>
+                    <a:bodyPr/>
+                    <a:lstStyle/>
+                    <a:p>
+                      <a:r>
+                        <a:rPr b="1" sz="1100"/>
+                        <a:t>Retention Period</a:t>
+                      </a:r>
+                    </a:p>
+                  </a:txBody>
+                  <a:tcPr>
+                    <a:solidFill>
+                      <a:srgbClr val="E7E6E6"/>
+                    </a:solidFill>
+                  </a:tcPr>
+                </a:tc>
+                <a:tc>
+                  <a:txBody>
+                    <a:bodyPr/>
+                    <a:lstStyle/>
+                    <a:p>
+                      <a:r>
+                        <a:rPr sz="1100"/>
+                        <a:t>90 days hot 2 years archive</a:t>
+                      </a:r>
+                    </a:p>
+                  </a:txBody>
+                  <a:tcPr>
+                    <a:solidFill>
+                      <a:srgbClr val="E7E6E6"/>
+                    </a:solidFill>
+                  </a:tcPr>
+                </a:tc>
+                <a:tc>
+                  <a:txBody>
+                    <a:bodyPr/>
+                    <a:lstStyle/>
+                    <a:p/>
+                  </a:txBody>
+                  <a:tcPr>
+                    <a:solidFill>
+                      <a:srgbClr val="FFFFFF"/>
+                    </a:solidFill>
                   </a:tcPr>
                 </a:tc>
                 <a:tc>
@@ -4133,615 +4693,6 @@
                       <a:r>
                         <a:rPr sz="1100"/>
                         <a:t>Single Azure region (East US)</a:t>
-                      </a:r>
-                    </a:p>
-                  </a:txBody>
-                  <a:tcPr>
-                    <a:solidFill>
-                      <a:srgbClr val="E7E6E6"/>
-                    </a:solidFill>
-                  </a:tcPr>
-                </a:tc>
-              </a:tr>
-              <a:tr h="370840">
-                <a:tc>
-                  <a:txBody>
-                    <a:bodyPr/>
-                    <a:lstStyle/>
-                    <a:p>
-                      <a:r>
-                        <a:rPr b="1" sz="1100"/>
-                        <a:t>Analytics Rules</a:t>
-                      </a:r>
-                    </a:p>
-                  </a:txBody>
-                  <a:tcPr>
-                    <a:solidFill>
-                      <a:srgbClr val="E7E6E6"/>
-                    </a:solidFill>
-                  </a:tcPr>
-                </a:tc>
-                <a:tc>
-                  <a:txBody>
-                    <a:bodyPr/>
-                    <a:lstStyle/>
-                    <a:p>
-                      <a:r>
-                        <a:rPr sz="1100"/>
-                        <a:t>50 custom detection rules</a:t>
-                      </a:r>
-                    </a:p>
-                  </a:txBody>
-                  <a:tcPr>
-                    <a:solidFill>
-                      <a:srgbClr val="E7E6E6"/>
-                    </a:solidFill>
-                  </a:tcPr>
-                </a:tc>
-                <a:tc>
-                  <a:txBody>
-                    <a:bodyPr/>
-                    <a:lstStyle/>
-                    <a:p/>
-                  </a:txBody>
-                  <a:tcPr>
-                    <a:solidFill>
-                      <a:srgbClr val="FFFFFF"/>
-                    </a:solidFill>
-                    <a:lnL w="12700">
-                      <a:solidFill>
-                        <a:srgbClr val="D0D0D0"/>
-                      </a:solidFill>
-                    </a:lnL>
-                  </a:tcPr>
-                </a:tc>
-                <a:tc>
-                  <a:txBody>
-                    <a:bodyPr/>
-                    <a:lstStyle/>
-                    <a:p>
-                      <a:r>
-                        <a:rPr b="1" sz="1100"/>
-                        <a:t>Availability Requirements</a:t>
-                      </a:r>
-                    </a:p>
-                  </a:txBody>
-                  <a:tcPr>
-                    <a:solidFill>
-                      <a:srgbClr val="E7E6E6"/>
-                    </a:solidFill>
-                  </a:tcPr>
-                </a:tc>
-                <a:tc>
-                  <a:txBody>
-                    <a:bodyPr/>
-                    <a:lstStyle/>
-                    <a:p>
-                      <a:r>
-                        <a:rPr sz="1100"/>
-                        <a:t>24/7 monitoring</a:t>
-                      </a:r>
-                    </a:p>
-                  </a:txBody>
-                  <a:tcPr>
-                    <a:solidFill>
-                      <a:srgbClr val="E7E6E6"/>
-                    </a:solidFill>
-                  </a:tcPr>
-                </a:tc>
-              </a:tr>
-              <a:tr h="370840">
-                <a:tc>
-                  <a:txBody>
-                    <a:bodyPr/>
-                    <a:lstStyle/>
-                    <a:p>
-                      <a:r>
-                        <a:rPr b="1" sz="1100"/>
-                        <a:t>Log Sources</a:t>
-                      </a:r>
-                    </a:p>
-                  </a:txBody>
-                  <a:tcPr>
-                    <a:solidFill>
-                      <a:srgbClr val="E7E6E6"/>
-                    </a:solidFill>
-                  </a:tcPr>
-                </a:tc>
-                <a:tc>
-                  <a:txBody>
-                    <a:bodyPr/>
-                    <a:lstStyle/>
-                    <a:p>
-                      <a:r>
-                        <a:rPr sz="1100"/>
-                        <a:t>Azure AD Office365 Firewall Endpoints</a:t>
-                      </a:r>
-                    </a:p>
-                  </a:txBody>
-                  <a:tcPr>
-                    <a:solidFill>
-                      <a:srgbClr val="E7E6E6"/>
-                    </a:solidFill>
-                  </a:tcPr>
-                </a:tc>
-                <a:tc>
-                  <a:txBody>
-                    <a:bodyPr/>
-                    <a:lstStyle/>
-                    <a:p/>
-                  </a:txBody>
-                  <a:tcPr>
-                    <a:solidFill>
-                      <a:srgbClr val="FFFFFF"/>
-                    </a:solidFill>
-                    <a:lnL w="12700">
-                      <a:solidFill>
-                        <a:srgbClr val="D0D0D0"/>
-                      </a:solidFill>
-                    </a:lnL>
-                  </a:tcPr>
-                </a:tc>
-                <a:tc>
-                  <a:txBody>
-                    <a:bodyPr/>
-                    <a:lstStyle/>
-                    <a:p>
-                      <a:r>
-                        <a:rPr b="1" sz="1100"/>
-                        <a:t>Infrastructure Complexity</a:t>
-                      </a:r>
-                    </a:p>
-                  </a:txBody>
-                  <a:tcPr>
-                    <a:solidFill>
-                      <a:srgbClr val="E7E6E6"/>
-                    </a:solidFill>
-                  </a:tcPr>
-                </a:tc>
-                <a:tc>
-                  <a:txBody>
-                    <a:bodyPr/>
-                    <a:lstStyle/>
-                    <a:p>
-                      <a:r>
-                        <a:rPr sz="1100"/>
-                        <a:t>Log Analytics + Sentinel workspace</a:t>
-                      </a:r>
-                    </a:p>
-                  </a:txBody>
-                  <a:tcPr>
-                    <a:solidFill>
-                      <a:srgbClr val="E7E6E6"/>
-                    </a:solidFill>
-                  </a:tcPr>
-                </a:tc>
-              </a:tr>
-              <a:tr h="370840">
-                <a:tc>
-                  <a:txBody>
-                    <a:bodyPr/>
-                    <a:lstStyle/>
-                    <a:p>
-                      <a:r>
-                        <a:rPr b="1" sz="1100"/>
-                        <a:t>SOAR Playbooks</a:t>
-                      </a:r>
-                    </a:p>
-                  </a:txBody>
-                  <a:tcPr>
-                    <a:solidFill>
-                      <a:srgbClr val="E7E6E6"/>
-                    </a:solidFill>
-                  </a:tcPr>
-                </a:tc>
-                <a:tc>
-                  <a:txBody>
-                    <a:bodyPr/>
-                    <a:lstStyle/>
-                    <a:p>
-                      <a:r>
-                        <a:rPr sz="1100"/>
-                        <a:t>10 automated playbooks</a:t>
-                      </a:r>
-                    </a:p>
-                  </a:txBody>
-                  <a:tcPr>
-                    <a:solidFill>
-                      <a:srgbClr val="E7E6E6"/>
-                    </a:solidFill>
-                  </a:tcPr>
-                </a:tc>
-                <a:tc>
-                  <a:txBody>
-                    <a:bodyPr/>
-                    <a:lstStyle/>
-                    <a:p/>
-                  </a:txBody>
-                  <a:tcPr>
-                    <a:solidFill>
-                      <a:srgbClr val="FFFFFF"/>
-                    </a:solidFill>
-                    <a:lnL w="12700">
-                      <a:solidFill>
-                        <a:srgbClr val="D0D0D0"/>
-                      </a:solidFill>
-                    </a:lnL>
-                  </a:tcPr>
-                </a:tc>
-                <a:tc>
-                  <a:txBody>
-                    <a:bodyPr/>
-                    <a:lstStyle/>
-                    <a:p>
-                      <a:r>
-                        <a:rPr b="1" sz="1100"/>
-                        <a:t>Security Requirements</a:t>
-                      </a:r>
-                    </a:p>
-                  </a:txBody>
-                  <a:tcPr>
-                    <a:solidFill>
-                      <a:srgbClr val="E7E6E6"/>
-                    </a:solidFill>
-                  </a:tcPr>
-                </a:tc>
-                <a:tc>
-                  <a:txBody>
-                    <a:bodyPr/>
-                    <a:lstStyle/>
-                    <a:p>
-                      <a:r>
-                        <a:rPr sz="1100"/>
-                        <a:t>RBAC MFA audit logging</a:t>
-                      </a:r>
-                    </a:p>
-                  </a:txBody>
-                  <a:tcPr>
-                    <a:solidFill>
-                      <a:srgbClr val="E7E6E6"/>
-                    </a:solidFill>
-                  </a:tcPr>
-                </a:tc>
-              </a:tr>
-              <a:tr h="370840">
-                <a:tc>
-                  <a:txBody>
-                    <a:bodyPr/>
-                    <a:lstStyle/>
-                    <a:p>
-                      <a:r>
-                        <a:rPr b="1" sz="1100"/>
-                        <a:t>Total Users</a:t>
-                      </a:r>
-                    </a:p>
-                  </a:txBody>
-                  <a:tcPr>
-                    <a:solidFill>
-                      <a:srgbClr val="E7E6E6"/>
-                    </a:solidFill>
-                  </a:tcPr>
-                </a:tc>
-                <a:tc>
-                  <a:txBody>
-                    <a:bodyPr/>
-                    <a:lstStyle/>
-                    <a:p>
-                      <a:r>
-                        <a:rPr sz="1100"/>
-                        <a:t>10 SOC analysts</a:t>
-                      </a:r>
-                    </a:p>
-                  </a:txBody>
-                  <a:tcPr>
-                    <a:solidFill>
-                      <a:srgbClr val="E7E6E6"/>
-                    </a:solidFill>
-                  </a:tcPr>
-                </a:tc>
-                <a:tc>
-                  <a:txBody>
-                    <a:bodyPr/>
-                    <a:lstStyle/>
-                    <a:p/>
-                  </a:txBody>
-                  <a:tcPr>
-                    <a:solidFill>
-                      <a:srgbClr val="FFFFFF"/>
-                    </a:solidFill>
-                    <a:lnL w="12700">
-                      <a:solidFill>
-                        <a:srgbClr val="D0D0D0"/>
-                      </a:solidFill>
-                    </a:lnL>
-                  </a:tcPr>
-                </a:tc>
-                <a:tc>
-                  <a:txBody>
-                    <a:bodyPr/>
-                    <a:lstStyle/>
-                    <a:p>
-                      <a:r>
-                        <a:rPr b="1" sz="1100"/>
-                        <a:t>Compliance Frameworks</a:t>
-                      </a:r>
-                    </a:p>
-                  </a:txBody>
-                  <a:tcPr>
-                    <a:solidFill>
-                      <a:srgbClr val="E7E6E6"/>
-                    </a:solidFill>
-                  </a:tcPr>
-                </a:tc>
-                <a:tc>
-                  <a:txBody>
-                    <a:bodyPr/>
-                    <a:lstStyle/>
-                    <a:p>
-                      <a:r>
-                        <a:rPr sz="1100"/>
-                        <a:t>SOC2 NIST CSF</a:t>
-                      </a:r>
-                    </a:p>
-                  </a:txBody>
-                  <a:tcPr>
-                    <a:solidFill>
-                      <a:srgbClr val="E7E6E6"/>
-                    </a:solidFill>
-                  </a:tcPr>
-                </a:tc>
-              </a:tr>
-              <a:tr h="370840">
-                <a:tc>
-                  <a:txBody>
-                    <a:bodyPr/>
-                    <a:lstStyle/>
-                    <a:p>
-                      <a:r>
-                        <a:rPr b="1" sz="1100"/>
-                        <a:t>User Roles</a:t>
-                      </a:r>
-                    </a:p>
-                  </a:txBody>
-                  <a:tcPr>
-                    <a:solidFill>
-                      <a:srgbClr val="E7E6E6"/>
-                    </a:solidFill>
-                  </a:tcPr>
-                </a:tc>
-                <a:tc>
-                  <a:txBody>
-                    <a:bodyPr/>
-                    <a:lstStyle/>
-                    <a:p>
-                      <a:r>
-                        <a:rPr sz="1100"/>
-                        <a:t>3 roles (analyst engineer admin)</a:t>
-                      </a:r>
-                    </a:p>
-                  </a:txBody>
-                  <a:tcPr>
-                    <a:solidFill>
-                      <a:srgbClr val="E7E6E6"/>
-                    </a:solidFill>
-                  </a:tcPr>
-                </a:tc>
-                <a:tc>
-                  <a:txBody>
-                    <a:bodyPr/>
-                    <a:lstStyle/>
-                    <a:p/>
-                  </a:txBody>
-                  <a:tcPr>
-                    <a:solidFill>
-                      <a:srgbClr val="FFFFFF"/>
-                    </a:solidFill>
-                    <a:lnL w="12700">
-                      <a:solidFill>
-                        <a:srgbClr val="D0D0D0"/>
-                      </a:solidFill>
-                    </a:lnL>
-                  </a:tcPr>
-                </a:tc>
-                <a:tc>
-                  <a:txBody>
-                    <a:bodyPr/>
-                    <a:lstStyle/>
-                    <a:p>
-                      <a:r>
-                        <a:rPr b="1" sz="1100"/>
-                        <a:t>Detection Response</a:t>
-                      </a:r>
-                    </a:p>
-                  </a:txBody>
-                  <a:tcPr>
-                    <a:solidFill>
-                      <a:srgbClr val="E7E6E6"/>
-                    </a:solidFill>
-                  </a:tcPr>
-                </a:tc>
-                <a:tc>
-                  <a:txBody>
-                    <a:bodyPr/>
-                    <a:lstStyle/>
-                    <a:p>
-                      <a:r>
-                        <a:rPr sz="1100"/>
-                        <a:t>MTTR &lt;1 hour</a:t>
-                      </a:r>
-                    </a:p>
-                  </a:txBody>
-                  <a:tcPr>
-                    <a:solidFill>
-                      <a:srgbClr val="E7E6E6"/>
-                    </a:solidFill>
-                  </a:tcPr>
-                </a:tc>
-              </a:tr>
-              <a:tr h="370840">
-                <a:tc>
-                  <a:txBody>
-                    <a:bodyPr/>
-                    <a:lstStyle/>
-                    <a:p>
-                      <a:r>
-                        <a:rPr b="1" sz="1100"/>
-                        <a:t>Daily Log Ingestion</a:t>
-                      </a:r>
-                    </a:p>
-                  </a:txBody>
-                  <a:tcPr>
-                    <a:solidFill>
-                      <a:srgbClr val="E7E6E6"/>
-                    </a:solidFill>
-                  </a:tcPr>
-                </a:tc>
-                <a:tc>
-                  <a:txBody>
-                    <a:bodyPr/>
-                    <a:lstStyle/>
-                    <a:p>
-                      <a:r>
-                        <a:rPr sz="1100"/>
-                        <a:t>50 GB/day</a:t>
-                      </a:r>
-                    </a:p>
-                  </a:txBody>
-                  <a:tcPr>
-                    <a:solidFill>
-                      <a:srgbClr val="E7E6E6"/>
-                    </a:solidFill>
-                  </a:tcPr>
-                </a:tc>
-                <a:tc>
-                  <a:txBody>
-                    <a:bodyPr/>
-                    <a:lstStyle/>
-                    <a:p/>
-                  </a:txBody>
-                  <a:tcPr>
-                    <a:solidFill>
-                      <a:srgbClr val="FFFFFF"/>
-                    </a:solidFill>
-                    <a:lnL w="12700">
-                      <a:solidFill>
-                        <a:srgbClr val="D0D0D0"/>
-                      </a:solidFill>
-                    </a:lnL>
-                  </a:tcPr>
-                </a:tc>
-                <a:tc>
-                  <a:txBody>
-                    <a:bodyPr/>
-                    <a:lstStyle/>
-                    <a:p>
-                      <a:r>
-                        <a:rPr b="1" sz="1100"/>
-                        <a:t>Query Performance</a:t>
-                      </a:r>
-                    </a:p>
-                  </a:txBody>
-                  <a:tcPr>
-                    <a:solidFill>
-                      <a:srgbClr val="E7E6E6"/>
-                    </a:solidFill>
-                  </a:tcPr>
-                </a:tc>
-                <a:tc>
-                  <a:txBody>
-                    <a:bodyPr/>
-                    <a:lstStyle/>
-                    <a:p>
-                      <a:r>
-                        <a:rPr sz="1100"/>
-                        <a:t>Standard KQL queries</a:t>
-                      </a:r>
-                    </a:p>
-                  </a:txBody>
-                  <a:tcPr>
-                    <a:solidFill>
-                      <a:srgbClr val="E7E6E6"/>
-                    </a:solidFill>
-                  </a:tcPr>
-                </a:tc>
-              </a:tr>
-              <a:tr h="370840">
-                <a:tc>
-                  <a:txBody>
-                    <a:bodyPr/>
-                    <a:lstStyle/>
-                    <a:p>
-                      <a:r>
-                        <a:rPr b="1" sz="1100"/>
-                        <a:t>Retention Period</a:t>
-                      </a:r>
-                    </a:p>
-                  </a:txBody>
-                  <a:tcPr>
-                    <a:solidFill>
-                      <a:srgbClr val="E7E6E6"/>
-                    </a:solidFill>
-                  </a:tcPr>
-                </a:tc>
-                <a:tc>
-                  <a:txBody>
-                    <a:bodyPr/>
-                    <a:lstStyle/>
-                    <a:p>
-                      <a:r>
-                        <a:rPr sz="1100"/>
-                        <a:t>90 days hot 2 years archive</a:t>
-                      </a:r>
-                    </a:p>
-                  </a:txBody>
-                  <a:tcPr>
-                    <a:solidFill>
-                      <a:srgbClr val="E7E6E6"/>
-                    </a:solidFill>
-                  </a:tcPr>
-                </a:tc>
-                <a:tc>
-                  <a:txBody>
-                    <a:bodyPr/>
-                    <a:lstStyle/>
-                    <a:p/>
-                  </a:txBody>
-                  <a:tcPr>
-                    <a:solidFill>
-                      <a:srgbClr val="FFFFFF"/>
-                    </a:solidFill>
-                    <a:lnL w="12700">
-                      <a:solidFill>
-                        <a:srgbClr val="D0D0D0"/>
-                      </a:solidFill>
-                    </a:lnL>
-                  </a:tcPr>
-                </a:tc>
-                <a:tc>
-                  <a:txBody>
-                    <a:bodyPr/>
-                    <a:lstStyle/>
-                    <a:p>
-                      <a:r>
-                        <a:rPr b="1" sz="1100"/>
-                        <a:t>Deployment Environments</a:t>
-                      </a:r>
-                    </a:p>
-                  </a:txBody>
-                  <a:tcPr>
-                    <a:solidFill>
-                      <a:srgbClr val="E7E6E6"/>
-                    </a:solidFill>
-                  </a:tcPr>
-                </a:tc>
-                <a:tc>
-                  <a:txBody>
-                    <a:bodyPr/>
-                    <a:lstStyle/>
-                    <a:p>
-                      <a:r>
-                        <a:rPr sz="1100"/>
-                        <a:t>2 environments (dev prod)</a:t>
                       </a:r>
                     </a:p>
                   </a:txBody>
@@ -4756,24 +4707,53 @@
           </a:graphicData>
         </a:graphic>
       </p:graphicFrame>
+      <p:sp>
+        <p:nvSpPr>
+          <p:cNvPr id="5" name="Text Placeholder 4"/>
+          <p:cNvSpPr>
+            <a:spLocks noGrp="1"/>
+          </p:cNvSpPr>
+          <p:nvPr>
+            <p:ph type="body" idx="15" sz="quarter"/>
+          </p:nvPr>
+        </p:nvSpPr>
+        <p:spPr/>
+        <p:txBody>
+          <a:bodyPr/>
+          <a:lstStyle/>
+          <a:p>
+            <a:pPr algn="r">
+              <a:buNone/>
+            </a:pPr>
+            <a:r>
+              <a:rPr sz="1100">
+                <a:solidFill>
+                  <a:srgbClr val="CC0000"/>
+                </a:solidFill>
+              </a:rPr>
+              <a:t>Microsoft Sentinel SIEM Implementation</a:t>
+            </a:r>
+          </a:p>
+        </p:txBody>
+      </p:sp>
       <p:pic>
         <p:nvPicPr>
-          <p:cNvPr id="5" name="Picture 4" descr="eo-framework-logo-real.png"/>
+          <p:cNvPr id="6" name="Picture 5" descr="consulting_company_logo.png"/>
           <p:cNvPicPr>
             <a:picLocks noChangeAspect="1"/>
           </p:cNvPicPr>
           <p:nvPr/>
         </p:nvPicPr>
         <p:blipFill>
-          <a:blip r:embed="rId3"/>
+          <a:blip r:embed="rId2"/>
           <a:stretch>
             <a:fillRect/>
           </a:stretch>
         </p:blipFill>
         <p:spPr>
           <a:xfrm>
-            <a:off x="6684264" y="4535424"/>
-            <a:ext cx="2139696" cy="530352"/>
+            <a:off x="313592" y="4536078"/>
+            <a:ext cx="2126273" cy="529698"/>
           </a:xfrm>
           <a:prstGeom prst="rect">
             <a:avLst/>
@@ -4813,42 +4793,12 @@
           <a:bodyPr/>
           <a:lstStyle/>
           <a:p>
+            <a:pPr algn="l"/>
             <a:r>
               <a:t>Solution Overview</a:t>
             </a:r>
           </a:p>
         </p:txBody>
-      </p:sp>
-      <p:pic>
-        <p:nvPicPr>
-          <p:cNvPr id="3" name="Picture Placeholder 2" descr="consulting_company_logo.png"/>
-          <p:cNvPicPr>
-            <a:picLocks noGrp="1" noChangeAspect="1"/>
-          </p:cNvPicPr>
-          <p:nvPr>
-            <p:ph type="pic" idx="14" sz="quarter"/>
-          </p:nvPr>
-        </p:nvPicPr>
-        <p:blipFill>
-          <a:blip r:embed="rId2"/>
-          <a:srcRect t="6494" b="6494"/>
-          <a:stretch>
-            <a:fillRect/>
-          </a:stretch>
-        </p:blipFill>
-        <p:spPr/>
-      </p:pic>
-      <p:sp>
-        <p:nvSpPr>
-          <p:cNvPr id="4" name="Picture Placeholder 3"/>
-          <p:cNvSpPr>
-            <a:spLocks noGrp="1"/>
-          </p:cNvSpPr>
-          <p:nvPr>
-            <p:ph type="pic" idx="15" sz="quarter"/>
-          </p:nvPr>
-        </p:nvSpPr>
-        <p:spPr/>
       </p:sp>
       <p:sp>
         <p:nvSpPr>
@@ -4934,24 +4884,83 @@
           </a:p>
         </p:txBody>
       </p:sp>
+      <p:sp>
+        <p:nvSpPr>
+          <p:cNvPr id="6" name="Text Placeholder 5"/>
+          <p:cNvSpPr>
+            <a:spLocks noGrp="1"/>
+          </p:cNvSpPr>
+          <p:nvPr>
+            <p:ph type="body" idx="17" sz="quarter"/>
+          </p:nvPr>
+        </p:nvSpPr>
+        <p:spPr/>
+        <p:txBody>
+          <a:bodyPr/>
+          <a:lstStyle/>
+          <a:p>
+            <a:pPr algn="r">
+              <a:buNone/>
+            </a:pPr>
+            <a:r>
+              <a:rPr sz="1100">
+                <a:solidFill>
+                  <a:srgbClr val="CC0000"/>
+                </a:solidFill>
+              </a:rPr>
+              <a:t>Microsoft Sentinel SIEM Implementation</a:t>
+            </a:r>
+          </a:p>
+        </p:txBody>
+      </p:sp>
       <p:pic>
         <p:nvPicPr>
-          <p:cNvPr id="6" name="Picture 5" descr="architecture-diagram.png"/>
+          <p:cNvPr id="7" name="Picture 6" descr="architecture-diagram.png"/>
           <p:cNvPicPr>
             <a:picLocks noChangeAspect="1"/>
           </p:cNvPicPr>
           <p:nvPr/>
         </p:nvPicPr>
         <p:blipFill>
-          <a:blip r:embed="rId4"/>
+          <a:blip r:embed="rId2"/>
           <a:stretch>
             <a:fillRect/>
           </a:stretch>
         </p:blipFill>
         <p:spPr>
           <a:xfrm>
-            <a:off x="5165474" y="685799"/>
-            <a:ext cx="3331078" cy="3815859"/>
+            <a:off x="4662488" y="685799"/>
+            <a:ext cx="4337050" cy="3815859"/>
+          </a:xfrm>
+          <a:prstGeom prst="rect">
+            <a:avLst/>
+          </a:prstGeom>
+          <a:ln w="12700">
+            <a:solidFill>
+              <a:srgbClr val="C0C0C0"/>
+            </a:solidFill>
+            <a:prstDash val="solid"/>
+          </a:ln>
+        </p:spPr>
+      </p:pic>
+      <p:pic>
+        <p:nvPicPr>
+          <p:cNvPr id="8" name="Picture 7" descr="consulting_company_logo.png"/>
+          <p:cNvPicPr>
+            <a:picLocks noChangeAspect="1"/>
+          </p:cNvPicPr>
+          <p:nvPr/>
+        </p:nvPicPr>
+        <p:blipFill>
+          <a:blip r:embed="rId3"/>
+          <a:stretch>
+            <a:fillRect/>
+          </a:stretch>
+        </p:blipFill>
+        <p:spPr>
+          <a:xfrm>
+            <a:off x="313592" y="4536078"/>
+            <a:ext cx="2130670" cy="529698"/>
           </a:xfrm>
           <a:prstGeom prst="rect">
             <a:avLst/>
@@ -4991,31 +5000,13 @@
           <a:bodyPr/>
           <a:lstStyle/>
           <a:p>
+            <a:pPr algn="l"/>
             <a:r>
               <a:t>Implementation Approach</a:t>
             </a:r>
           </a:p>
         </p:txBody>
       </p:sp>
-      <p:pic>
-        <p:nvPicPr>
-          <p:cNvPr id="3" name="Picture Placeholder 2" descr="consulting_company_logo.png"/>
-          <p:cNvPicPr>
-            <a:picLocks noGrp="1" noChangeAspect="1"/>
-          </p:cNvPicPr>
-          <p:nvPr>
-            <p:ph type="pic" idx="13" sz="quarter"/>
-          </p:nvPr>
-        </p:nvPicPr>
-        <p:blipFill>
-          <a:blip r:embed="rId2"/>
-          <a:srcRect t="6762" b="6762"/>
-          <a:stretch>
-            <a:fillRect/>
-          </a:stretch>
-        </p:blipFill>
-        <p:spPr/>
-      </p:pic>
       <p:sp>
         <p:nvSpPr>
           <p:cNvPr id="4" name="Text Placeholder 3"/>
@@ -5116,24 +5107,53 @@
           </a:p>
         </p:txBody>
       </p:sp>
+      <p:sp>
+        <p:nvSpPr>
+          <p:cNvPr id="5" name="Text Placeholder 4"/>
+          <p:cNvSpPr>
+            <a:spLocks noGrp="1"/>
+          </p:cNvSpPr>
+          <p:nvPr>
+            <p:ph type="body" idx="15" sz="quarter"/>
+          </p:nvPr>
+        </p:nvSpPr>
+        <p:spPr/>
+        <p:txBody>
+          <a:bodyPr/>
+          <a:lstStyle/>
+          <a:p>
+            <a:pPr algn="r">
+              <a:buNone/>
+            </a:pPr>
+            <a:r>
+              <a:rPr sz="1100">
+                <a:solidFill>
+                  <a:srgbClr val="CC0000"/>
+                </a:solidFill>
+              </a:rPr>
+              <a:t>Microsoft Sentinel SIEM Implementation</a:t>
+            </a:r>
+          </a:p>
+        </p:txBody>
+      </p:sp>
       <p:pic>
         <p:nvPicPr>
-          <p:cNvPr id="5" name="Picture 4" descr="eo-framework-logo-real.png"/>
+          <p:cNvPr id="6" name="Picture 5" descr="consulting_company_logo.png"/>
           <p:cNvPicPr>
             <a:picLocks noChangeAspect="1"/>
           </p:cNvPicPr>
           <p:nvPr/>
         </p:nvPicPr>
         <p:blipFill>
-          <a:blip r:embed="rId3"/>
+          <a:blip r:embed="rId2"/>
           <a:stretch>
             <a:fillRect/>
           </a:stretch>
         </p:blipFill>
         <p:spPr>
           <a:xfrm>
-            <a:off x="6684264" y="4535424"/>
-            <a:ext cx="2139696" cy="530352"/>
+            <a:off x="313593" y="4536078"/>
+            <a:ext cx="2143858" cy="529698"/>
           </a:xfrm>
           <a:prstGeom prst="rect">
             <a:avLst/>
@@ -5175,31 +5195,11 @@
           <a:p>
             <a:pPr algn="l"/>
             <a:r>
-              <a:rPr b="1"/>
               <a:t>Timeline &amp; Milestones</a:t>
             </a:r>
           </a:p>
         </p:txBody>
       </p:sp>
-      <p:pic>
-        <p:nvPicPr>
-          <p:cNvPr id="3" name="Picture Placeholder 2" descr="consulting_company_logo.png"/>
-          <p:cNvPicPr>
-            <a:picLocks noGrp="1" noChangeAspect="1"/>
-          </p:cNvPicPr>
-          <p:nvPr>
-            <p:ph type="pic" idx="13" sz="quarter"/>
-          </p:nvPr>
-        </p:nvPicPr>
-        <p:blipFill>
-          <a:blip r:embed="rId2"/>
-          <a:srcRect t="6404" b="6404"/>
-          <a:stretch>
-            <a:fillRect/>
-          </a:stretch>
-        </p:blipFill>
-        <p:spPr/>
-      </p:pic>
       <p:graphicFrame>
         <p:nvGraphicFramePr>
           <p:cNvPr id="4" name="Table Placeholder 3"/>
@@ -5526,24 +5526,53 @@
           </a:graphicData>
         </a:graphic>
       </p:graphicFrame>
+      <p:sp>
+        <p:nvSpPr>
+          <p:cNvPr id="5" name="Text Placeholder 4"/>
+          <p:cNvSpPr>
+            <a:spLocks noGrp="1"/>
+          </p:cNvSpPr>
+          <p:nvPr>
+            <p:ph type="body" idx="15" sz="quarter"/>
+          </p:nvPr>
+        </p:nvSpPr>
+        <p:spPr/>
+        <p:txBody>
+          <a:bodyPr/>
+          <a:lstStyle/>
+          <a:p>
+            <a:pPr algn="r">
+              <a:buNone/>
+            </a:pPr>
+            <a:r>
+              <a:rPr sz="1100">
+                <a:solidFill>
+                  <a:srgbClr val="CC0000"/>
+                </a:solidFill>
+              </a:rPr>
+              <a:t>Microsoft Sentinel SIEM Implementation</a:t>
+            </a:r>
+          </a:p>
+        </p:txBody>
+      </p:sp>
       <p:pic>
         <p:nvPicPr>
-          <p:cNvPr id="5" name="Picture 4" descr="eo-framework-logo-real.png"/>
+          <p:cNvPr id="6" name="Picture 5" descr="consulting_company_logo.png"/>
           <p:cNvPicPr>
             <a:picLocks noChangeAspect="1"/>
           </p:cNvPicPr>
           <p:nvPr/>
         </p:nvPicPr>
         <p:blipFill>
-          <a:blip r:embed="rId3"/>
+          <a:blip r:embed="rId2"/>
           <a:stretch>
             <a:fillRect/>
           </a:stretch>
         </p:blipFill>
         <p:spPr>
           <a:xfrm>
-            <a:off x="6684264" y="4535424"/>
-            <a:ext cx="2139696" cy="530352"/>
+            <a:off x="313592" y="4536078"/>
+            <a:ext cx="2126273" cy="529698"/>
           </a:xfrm>
           <a:prstGeom prst="rect">
             <a:avLst/>
@@ -5583,31 +5612,13 @@
           <a:bodyPr/>
           <a:lstStyle/>
           <a:p>
+            <a:pPr algn="l"/>
             <a:r>
               <a:t>Success Stories</a:t>
             </a:r>
           </a:p>
         </p:txBody>
       </p:sp>
-      <p:pic>
-        <p:nvPicPr>
-          <p:cNvPr id="3" name="Picture Placeholder 2" descr="consulting_company_logo.png"/>
-          <p:cNvPicPr>
-            <a:picLocks noGrp="1" noChangeAspect="1"/>
-          </p:cNvPicPr>
-          <p:nvPr>
-            <p:ph type="pic" idx="13" sz="quarter"/>
-          </p:nvPr>
-        </p:nvPicPr>
-        <p:blipFill>
-          <a:blip r:embed="rId2"/>
-          <a:srcRect t="6762" b="6762"/>
-          <a:stretch>
-            <a:fillRect/>
-          </a:stretch>
-        </p:blipFill>
-        <p:spPr/>
-      </p:pic>
       <p:sp>
         <p:nvSpPr>
           <p:cNvPr id="4" name="Text Placeholder 3"/>
@@ -5636,7 +5647,7 @@
               <a:t>Client:</a:t>
             </a:r>
             <a:r>
-              <a:t> Healthcare organization with 5,000+ employees across 12 facilities managing patient data</a:t>
+              <a:t> Healthcare organization with 5,000+ employees across 12 facilities</a:t>
             </a:r>
           </a:p>
           <a:p>
@@ -5656,7 +5667,7 @@
               <a:t>Solution:</a:t>
             </a:r>
             <a:r>
-              <a:t> Deployed Microsoft Sentinel with unified log collection from all systems, AI-powered threat detection, and automated incident response playbooks for common security events</a:t>
+              <a:t> Deployed Microsoft Sentinel with unified log collection, AI-powered threat detection, and automated incident response playbooks</a:t>
             </a:r>
           </a:p>
           <a:p>
@@ -5666,7 +5677,7 @@
               <a:t>Results:</a:t>
             </a:r>
             <a:r>
-              <a:t> 90% reduction in alert noise (from 10,000 to 1,000 actionable alerts daily), threat detection time reduced from 48 hours to 15 minutes, full HIPAA compliance reporting automated, security team productivity increased 3x</a:t>
+              <a:t> 90% reduction in alert noise, threat detection time reduced from 48 hours to 15 minutes, full HIPAA compliance automated, security team productivity increased 3x</a:t>
             </a:r>
           </a:p>
           <a:p>
@@ -5676,36 +5687,65 @@
               <a:t>Testimonial:</a:t>
             </a:r>
             <a:r>
-              <a:t> "Microsoft Sentinel transformed our security operations. We went from drowning in alerts to proactively hunting threats. The automated playbooks handle routine incidents automatically, freeing our team to focus on advanced threats. We finally have the visibility and response capability we needed." — </a:t>
+              <a:t> "Microsoft Sentinel transformed our security operations. We went from drowning in alerts to proactively hunting threats. The automated playbooks freed our team to focus on advanced threats." — </a:t>
             </a:r>
             <a:r>
               <a:rPr b="1"/>
-              <a:t>Sarah Martinez, Chief Information Security Officer</a:t>
+              <a:t>Sarah Martinez, CISO</a:t>
             </a:r>
             <a:r>
               <a:t>, Regional Healthcare Network</a:t>
+            </a:r>
+          </a:p>
+        </p:txBody>
+      </p:sp>
+      <p:sp>
+        <p:nvSpPr>
+          <p:cNvPr id="5" name="Text Placeholder 4"/>
+          <p:cNvSpPr>
+            <a:spLocks noGrp="1"/>
+          </p:cNvSpPr>
+          <p:nvPr>
+            <p:ph type="body" idx="15" sz="quarter"/>
+          </p:nvPr>
+        </p:nvSpPr>
+        <p:spPr/>
+        <p:txBody>
+          <a:bodyPr/>
+          <a:lstStyle/>
+          <a:p>
+            <a:pPr algn="r">
+              <a:buNone/>
+            </a:pPr>
+            <a:r>
+              <a:rPr sz="1100">
+                <a:solidFill>
+                  <a:srgbClr val="CC0000"/>
+                </a:solidFill>
+              </a:rPr>
+              <a:t>Microsoft Sentinel SIEM Implementation</a:t>
             </a:r>
           </a:p>
         </p:txBody>
       </p:sp>
       <p:pic>
         <p:nvPicPr>
-          <p:cNvPr id="5" name="Picture 4" descr="eo-framework-logo-real.png"/>
+          <p:cNvPr id="6" name="Picture 5" descr="consulting_company_logo.png"/>
           <p:cNvPicPr>
             <a:picLocks noChangeAspect="1"/>
           </p:cNvPicPr>
           <p:nvPr/>
         </p:nvPicPr>
         <p:blipFill>
-          <a:blip r:embed="rId3"/>
+          <a:blip r:embed="rId2"/>
           <a:stretch>
             <a:fillRect/>
           </a:stretch>
         </p:blipFill>
         <p:spPr>
           <a:xfrm>
-            <a:off x="6684264" y="4535424"/>
-            <a:ext cx="2139696" cy="530352"/>
+            <a:off x="313593" y="4536078"/>
+            <a:ext cx="2143858" cy="529698"/>
           </a:xfrm>
           <a:prstGeom prst="rect">
             <a:avLst/>
@@ -5745,31 +5785,13 @@
           <a:bodyPr/>
           <a:lstStyle/>
           <a:p>
+            <a:pPr algn="l"/>
             <a:r>
               <a:t>Our Partnership Advantage</a:t>
             </a:r>
           </a:p>
         </p:txBody>
       </p:sp>
-      <p:pic>
-        <p:nvPicPr>
-          <p:cNvPr id="3" name="Picture Placeholder 2" descr="consulting_company_logo.png"/>
-          <p:cNvPicPr>
-            <a:picLocks noGrp="1" noChangeAspect="1"/>
-          </p:cNvPicPr>
-          <p:nvPr>
-            <p:ph type="pic" idx="14" sz="quarter"/>
-          </p:nvPr>
-        </p:nvPicPr>
-        <p:blipFill>
-          <a:blip r:embed="rId2"/>
-          <a:srcRect t="6314" b="6314"/>
-          <a:stretch>
-            <a:fillRect/>
-          </a:stretch>
-        </p:blipFill>
-        <p:spPr/>
-      </p:pic>
       <p:sp>
         <p:nvSpPr>
           <p:cNvPr id="4" name="Text Placeholder 3"/>
@@ -5815,12 +5837,6 @@
               <a:t>Certified security architects with Azure Security Engineer certifications</a:t>
             </a:r>
           </a:p>
-          <a:p>
-            <a:pPr lvl="1"/>
-            <a:r>
-              <a:t>24/7 security operations support with 99.5% SLA guarantee</a:t>
-            </a:r>
-          </a:p>
         </p:txBody>
       </p:sp>
       <p:sp>
@@ -5859,41 +5875,64 @@
           <a:p>
             <a:pPr lvl="1"/>
             <a:r>
-              <a:t>Direct Microsoft escalation and early-access to new Sentinel features</a:t>
+              <a:t>Comprehensive skills transfer for security team self-sufficiency</a:t>
             </a:r>
           </a:p>
           <a:p>
             <a:pPr lvl="1"/>
             <a:r>
-              <a:t>Comprehensive skills transfer for security team self-sufficiency</a:t>
-            </a:r>
-          </a:p>
-          <a:p>
-            <a:pPr lvl="1"/>
-            <a:r>
               <a:t>Best practices from 150+ security implementations</a:t>
+            </a:r>
+          </a:p>
+        </p:txBody>
+      </p:sp>
+      <p:sp>
+        <p:nvSpPr>
+          <p:cNvPr id="6" name="Text Placeholder 5"/>
+          <p:cNvSpPr>
+            <a:spLocks noGrp="1"/>
+          </p:cNvSpPr>
+          <p:nvPr>
+            <p:ph type="body" idx="15" sz="quarter"/>
+          </p:nvPr>
+        </p:nvSpPr>
+        <p:spPr/>
+        <p:txBody>
+          <a:bodyPr/>
+          <a:lstStyle/>
+          <a:p>
+            <a:pPr algn="r">
+              <a:buNone/>
+            </a:pPr>
+            <a:r>
+              <a:rPr sz="1100">
+                <a:solidFill>
+                  <a:srgbClr val="CC0000"/>
+                </a:solidFill>
+              </a:rPr>
+              <a:t>Microsoft Sentinel SIEM Implementation</a:t>
             </a:r>
           </a:p>
         </p:txBody>
       </p:sp>
       <p:pic>
         <p:nvPicPr>
-          <p:cNvPr id="6" name="Picture 5" descr="eo-framework-logo-real.png"/>
+          <p:cNvPr id="7" name="Picture 6" descr="consulting_company_logo.png"/>
           <p:cNvPicPr>
             <a:picLocks noChangeAspect="1"/>
           </p:cNvPicPr>
           <p:nvPr/>
         </p:nvPicPr>
         <p:blipFill>
-          <a:blip r:embed="rId3"/>
+          <a:blip r:embed="rId2"/>
           <a:stretch>
             <a:fillRect/>
           </a:stretch>
         </p:blipFill>
         <p:spPr>
           <a:xfrm>
-            <a:off x="6684264" y="4535424"/>
-            <a:ext cx="2139696" cy="530352"/>
+            <a:off x="313592" y="4536078"/>
+            <a:ext cx="2121877" cy="529698"/>
           </a:xfrm>
           <a:prstGeom prst="rect">
             <a:avLst/>
@@ -5935,31 +5974,11 @@
           <a:p>
             <a:pPr algn="l"/>
             <a:r>
-              <a:rPr b="1"/>
               <a:t>Investment Summary</a:t>
             </a:r>
           </a:p>
         </p:txBody>
       </p:sp>
-      <p:pic>
-        <p:nvPicPr>
-          <p:cNvPr id="3" name="Picture Placeholder 2" descr="consulting_company_logo.png"/>
-          <p:cNvPicPr>
-            <a:picLocks noGrp="1" noChangeAspect="1"/>
-          </p:cNvPicPr>
-          <p:nvPr>
-            <p:ph type="pic" idx="13" sz="quarter"/>
-          </p:nvPr>
-        </p:nvPicPr>
-        <p:blipFill>
-          <a:blip r:embed="rId2"/>
-          <a:srcRect t="6404" b="6404"/>
-          <a:stretch>
-            <a:fillRect/>
-          </a:stretch>
-        </p:blipFill>
-        <p:spPr/>
-      </p:pic>
       <p:graphicFrame>
         <p:nvGraphicFramePr>
           <p:cNvPr id="4" name="Table Placeholder 3"/>
@@ -5972,7 +5991,7 @@
         </p:nvGraphicFramePr>
         <p:xfrm>
           <a:off x="256855" y="677011"/>
-          <a:ext cx="8710929" cy="741680"/>
+          <a:ext cx="8710930" cy="2225040"/>
         </p:xfrm>
         <a:graphic>
           <a:graphicData uri="http://schemas.openxmlformats.org/drawingml/2006/table">
@@ -5981,13 +6000,13 @@
                 <a:tableStyleId>{5C22544A-7EE6-4342-B048-85BDC9FD1C3A}</a:tableStyleId>
               </a:tblPr>
               <a:tblGrid>
-                <a:gridCol w="2177733"/>
-                <a:gridCol w="1306639"/>
-                <a:gridCol w="1306639"/>
-                <a:gridCol w="1306639"/>
-                <a:gridCol w="871093"/>
-                <a:gridCol w="871093"/>
-                <a:gridCol w="871093"/>
+                <a:gridCol w="1997920"/>
+                <a:gridCol w="1198752"/>
+                <a:gridCol w="1198752"/>
+                <a:gridCol w="1198752"/>
+                <a:gridCol w="959001"/>
+                <a:gridCol w="959001"/>
+                <a:gridCol w="1198752"/>
               </a:tblGrid>
               <a:tr h="370840">
                 <a:tc>
@@ -6043,7 +6062,7 @@
                             <a:srgbClr val="FFFFFF"/>
                           </a:solidFill>
                         </a:rPr>
-                        <a:t>Provider/Partner Credits</a:t>
+                        <a:t>Year 1 Credits</a:t>
                       </a:r>
                     </a:p>
                   </a:txBody>
@@ -6145,8 +6164,492 @@
                     <a:lstStyle/>
                     <a:p>
                       <a:r>
+                        <a:rPr sz="1100"/>
+                        <a:t>Professional Services</a:t>
+                      </a:r>
+                    </a:p>
+                  </a:txBody>
+                  <a:tcPr>
+                    <a:solidFill>
+                      <a:srgbClr val="E7E6E6"/>
+                    </a:solidFill>
+                  </a:tcPr>
+                </a:tc>
+                <a:tc>
+                  <a:txBody>
+                    <a:bodyPr/>
+                    <a:lstStyle/>
+                    <a:p>
+                      <a:r>
+                        <a:rPr sz="1100"/>
+                        <a:t>$137,000</a:t>
+                      </a:r>
+                    </a:p>
+                  </a:txBody>
+                  <a:tcPr>
+                    <a:solidFill>
+                      <a:srgbClr val="E7E6E6"/>
+                    </a:solidFill>
+                  </a:tcPr>
+                </a:tc>
+                <a:tc>
+                  <a:txBody>
+                    <a:bodyPr/>
+                    <a:lstStyle/>
+                    <a:p>
+                      <a:r>
+                        <a:rPr sz="1100"/>
+                        <a:t>$0</a:t>
+                      </a:r>
+                    </a:p>
+                  </a:txBody>
+                  <a:tcPr>
+                    <a:solidFill>
+                      <a:srgbClr val="E7E6E6"/>
+                    </a:solidFill>
+                  </a:tcPr>
+                </a:tc>
+                <a:tc>
+                  <a:txBody>
+                    <a:bodyPr/>
+                    <a:lstStyle/>
+                    <a:p>
+                      <a:r>
+                        <a:rPr sz="1100"/>
+                        <a:t>$137,000</a:t>
+                      </a:r>
+                    </a:p>
+                  </a:txBody>
+                  <a:tcPr>
+                    <a:solidFill>
+                      <a:srgbClr val="E7E6E6"/>
+                    </a:solidFill>
+                  </a:tcPr>
+                </a:tc>
+                <a:tc>
+                  <a:txBody>
+                    <a:bodyPr/>
+                    <a:lstStyle/>
+                    <a:p>
+                      <a:r>
+                        <a:rPr sz="1100"/>
+                        <a:t>$0</a:t>
+                      </a:r>
+                    </a:p>
+                  </a:txBody>
+                  <a:tcPr>
+                    <a:solidFill>
+                      <a:srgbClr val="E7E6E6"/>
+                    </a:solidFill>
+                  </a:tcPr>
+                </a:tc>
+                <a:tc>
+                  <a:txBody>
+                    <a:bodyPr/>
+                    <a:lstStyle/>
+                    <a:p>
+                      <a:r>
+                        <a:rPr sz="1100"/>
+                        <a:t>$0</a:t>
+                      </a:r>
+                    </a:p>
+                  </a:txBody>
+                  <a:tcPr>
+                    <a:solidFill>
+                      <a:srgbClr val="E7E6E6"/>
+                    </a:solidFill>
+                  </a:tcPr>
+                </a:tc>
+                <a:tc>
+                  <a:txBody>
+                    <a:bodyPr/>
+                    <a:lstStyle/>
+                    <a:p>
+                      <a:r>
+                        <a:rPr sz="1100"/>
+                        <a:t>$137,000</a:t>
+                      </a:r>
+                    </a:p>
+                  </a:txBody>
+                  <a:tcPr>
+                    <a:solidFill>
+                      <a:srgbClr val="E7E6E6"/>
+                    </a:solidFill>
+                  </a:tcPr>
+                </a:tc>
+              </a:tr>
+              <a:tr h="370840">
+                <a:tc>
+                  <a:txBody>
+                    <a:bodyPr/>
+                    <a:lstStyle/>
+                    <a:p>
+                      <a:r>
+                        <a:rPr sz="1100"/>
+                        <a:t>Cloud Infrastructure</a:t>
+                      </a:r>
+                    </a:p>
+                  </a:txBody>
+                  <a:tcPr>
+                    <a:solidFill>
+                      <a:srgbClr val="E7E6E6"/>
+                    </a:solidFill>
+                  </a:tcPr>
+                </a:tc>
+                <a:tc>
+                  <a:txBody>
+                    <a:bodyPr/>
+                    <a:lstStyle/>
+                    <a:p>
+                      <a:r>
+                        <a:rPr sz="1100"/>
+                        <a:t>$191,140</a:t>
+                      </a:r>
+                    </a:p>
+                  </a:txBody>
+                  <a:tcPr>
+                    <a:solidFill>
+                      <a:srgbClr val="E7E6E6"/>
+                    </a:solidFill>
+                  </a:tcPr>
+                </a:tc>
+                <a:tc>
+                  <a:txBody>
+                    <a:bodyPr/>
+                    <a:lstStyle/>
+                    <a:p>
+                      <a:r>
+                        <a:rPr sz="1100"/>
+                        <a:t>($9,000)</a:t>
+                      </a:r>
+                    </a:p>
+                  </a:txBody>
+                  <a:tcPr>
+                    <a:solidFill>
+                      <a:srgbClr val="E7E6E6"/>
+                    </a:solidFill>
+                  </a:tcPr>
+                </a:tc>
+                <a:tc>
+                  <a:txBody>
+                    <a:bodyPr/>
+                    <a:lstStyle/>
+                    <a:p>
+                      <a:r>
+                        <a:rPr sz="1100"/>
+                        <a:t>$182,140</a:t>
+                      </a:r>
+                    </a:p>
+                  </a:txBody>
+                  <a:tcPr>
+                    <a:solidFill>
+                      <a:srgbClr val="E7E6E6"/>
+                    </a:solidFill>
+                  </a:tcPr>
+                </a:tc>
+                <a:tc>
+                  <a:txBody>
+                    <a:bodyPr/>
+                    <a:lstStyle/>
+                    <a:p>
+                      <a:r>
+                        <a:rPr sz="1100"/>
+                        <a:t>$191,140</a:t>
+                      </a:r>
+                    </a:p>
+                  </a:txBody>
+                  <a:tcPr>
+                    <a:solidFill>
+                      <a:srgbClr val="E7E6E6"/>
+                    </a:solidFill>
+                  </a:tcPr>
+                </a:tc>
+                <a:tc>
+                  <a:txBody>
+                    <a:bodyPr/>
+                    <a:lstStyle/>
+                    <a:p>
+                      <a:r>
+                        <a:rPr sz="1100"/>
+                        <a:t>$191,140</a:t>
+                      </a:r>
+                    </a:p>
+                  </a:txBody>
+                  <a:tcPr>
+                    <a:solidFill>
+                      <a:srgbClr val="E7E6E6"/>
+                    </a:solidFill>
+                  </a:tcPr>
+                </a:tc>
+                <a:tc>
+                  <a:txBody>
+                    <a:bodyPr/>
+                    <a:lstStyle/>
+                    <a:p>
+                      <a:r>
+                        <a:rPr sz="1100"/>
+                        <a:t>$564,420</a:t>
+                      </a:r>
+                    </a:p>
+                  </a:txBody>
+                  <a:tcPr>
+                    <a:solidFill>
+                      <a:srgbClr val="E7E6E6"/>
+                    </a:solidFill>
+                  </a:tcPr>
+                </a:tc>
+              </a:tr>
+              <a:tr h="370840">
+                <a:tc>
+                  <a:txBody>
+                    <a:bodyPr/>
+                    <a:lstStyle/>
+                    <a:p>
+                      <a:r>
+                        <a:rPr sz="1100"/>
+                        <a:t>Software Licenses</a:t>
+                      </a:r>
+                    </a:p>
+                  </a:txBody>
+                  <a:tcPr>
+                    <a:solidFill>
+                      <a:srgbClr val="E7E6E6"/>
+                    </a:solidFill>
+                  </a:tcPr>
+                </a:tc>
+                <a:tc>
+                  <a:txBody>
+                    <a:bodyPr/>
+                    <a:lstStyle/>
+                    <a:p>
+                      <a:r>
+                        <a:rPr sz="1100"/>
+                        <a:t>$7,400</a:t>
+                      </a:r>
+                    </a:p>
+                  </a:txBody>
+                  <a:tcPr>
+                    <a:solidFill>
+                      <a:srgbClr val="E7E6E6"/>
+                    </a:solidFill>
+                  </a:tcPr>
+                </a:tc>
+                <a:tc>
+                  <a:txBody>
+                    <a:bodyPr/>
+                    <a:lstStyle/>
+                    <a:p>
+                      <a:r>
+                        <a:rPr sz="1100"/>
+                        <a:t>$0</a:t>
+                      </a:r>
+                    </a:p>
+                  </a:txBody>
+                  <a:tcPr>
+                    <a:solidFill>
+                      <a:srgbClr val="E7E6E6"/>
+                    </a:solidFill>
+                  </a:tcPr>
+                </a:tc>
+                <a:tc>
+                  <a:txBody>
+                    <a:bodyPr/>
+                    <a:lstStyle/>
+                    <a:p>
+                      <a:r>
+                        <a:rPr sz="1100"/>
+                        <a:t>$7,400</a:t>
+                      </a:r>
+                    </a:p>
+                  </a:txBody>
+                  <a:tcPr>
+                    <a:solidFill>
+                      <a:srgbClr val="E7E6E6"/>
+                    </a:solidFill>
+                  </a:tcPr>
+                </a:tc>
+                <a:tc>
+                  <a:txBody>
+                    <a:bodyPr/>
+                    <a:lstStyle/>
+                    <a:p>
+                      <a:r>
+                        <a:rPr sz="1100"/>
+                        <a:t>$7,400</a:t>
+                      </a:r>
+                    </a:p>
+                  </a:txBody>
+                  <a:tcPr>
+                    <a:solidFill>
+                      <a:srgbClr val="E7E6E6"/>
+                    </a:solidFill>
+                  </a:tcPr>
+                </a:tc>
+                <a:tc>
+                  <a:txBody>
+                    <a:bodyPr/>
+                    <a:lstStyle/>
+                    <a:p>
+                      <a:r>
+                        <a:rPr sz="1100"/>
+                        <a:t>$7,400</a:t>
+                      </a:r>
+                    </a:p>
+                  </a:txBody>
+                  <a:tcPr>
+                    <a:solidFill>
+                      <a:srgbClr val="E7E6E6"/>
+                    </a:solidFill>
+                  </a:tcPr>
+                </a:tc>
+                <a:tc>
+                  <a:txBody>
+                    <a:bodyPr/>
+                    <a:lstStyle/>
+                    <a:p>
+                      <a:r>
+                        <a:rPr sz="1100"/>
+                        <a:t>$22,200</a:t>
+                      </a:r>
+                    </a:p>
+                  </a:txBody>
+                  <a:tcPr>
+                    <a:solidFill>
+                      <a:srgbClr val="E7E6E6"/>
+                    </a:solidFill>
+                  </a:tcPr>
+                </a:tc>
+              </a:tr>
+              <a:tr h="370840">
+                <a:tc>
+                  <a:txBody>
+                    <a:bodyPr/>
+                    <a:lstStyle/>
+                    <a:p>
+                      <a:r>
+                        <a:rPr sz="1100"/>
+                        <a:t>Support &amp; Maintenance</a:t>
+                      </a:r>
+                    </a:p>
+                  </a:txBody>
+                  <a:tcPr>
+                    <a:solidFill>
+                      <a:srgbClr val="E7E6E6"/>
+                    </a:solidFill>
+                  </a:tcPr>
+                </a:tc>
+                <a:tc>
+                  <a:txBody>
+                    <a:bodyPr/>
+                    <a:lstStyle/>
+                    <a:p>
+                      <a:r>
+                        <a:rPr sz="1100"/>
+                        <a:t>$19,428</a:t>
+                      </a:r>
+                    </a:p>
+                  </a:txBody>
+                  <a:tcPr>
+                    <a:solidFill>
+                      <a:srgbClr val="E7E6E6"/>
+                    </a:solidFill>
+                  </a:tcPr>
+                </a:tc>
+                <a:tc>
+                  <a:txBody>
+                    <a:bodyPr/>
+                    <a:lstStyle/>
+                    <a:p>
+                      <a:r>
+                        <a:rPr sz="1100"/>
+                        <a:t>($12,000)</a:t>
+                      </a:r>
+                    </a:p>
+                  </a:txBody>
+                  <a:tcPr>
+                    <a:solidFill>
+                      <a:srgbClr val="E7E6E6"/>
+                    </a:solidFill>
+                  </a:tcPr>
+                </a:tc>
+                <a:tc>
+                  <a:txBody>
+                    <a:bodyPr/>
+                    <a:lstStyle/>
+                    <a:p>
+                      <a:r>
+                        <a:rPr sz="1100"/>
+                        <a:t>$7,428</a:t>
+                      </a:r>
+                    </a:p>
+                  </a:txBody>
+                  <a:tcPr>
+                    <a:solidFill>
+                      <a:srgbClr val="E7E6E6"/>
+                    </a:solidFill>
+                  </a:tcPr>
+                </a:tc>
+                <a:tc>
+                  <a:txBody>
+                    <a:bodyPr/>
+                    <a:lstStyle/>
+                    <a:p>
+                      <a:r>
+                        <a:rPr sz="1100"/>
+                        <a:t>$19,428</a:t>
+                      </a:r>
+                    </a:p>
+                  </a:txBody>
+                  <a:tcPr>
+                    <a:solidFill>
+                      <a:srgbClr val="E7E6E6"/>
+                    </a:solidFill>
+                  </a:tcPr>
+                </a:tc>
+                <a:tc>
+                  <a:txBody>
+                    <a:bodyPr/>
+                    <a:lstStyle/>
+                    <a:p>
+                      <a:r>
+                        <a:rPr sz="1100"/>
+                        <a:t>$19,428</a:t>
+                      </a:r>
+                    </a:p>
+                  </a:txBody>
+                  <a:tcPr>
+                    <a:solidFill>
+                      <a:srgbClr val="E7E6E6"/>
+                    </a:solidFill>
+                  </a:tcPr>
+                </a:tc>
+                <a:tc>
+                  <a:txBody>
+                    <a:bodyPr/>
+                    <a:lstStyle/>
+                    <a:p>
+                      <a:r>
+                        <a:rPr sz="1100"/>
+                        <a:t>$46,284</a:t>
+                      </a:r>
+                    </a:p>
+                  </a:txBody>
+                  <a:tcPr>
+                    <a:solidFill>
+                      <a:srgbClr val="E7E6E6"/>
+                    </a:solidFill>
+                  </a:tcPr>
+                </a:tc>
+              </a:tr>
+              <a:tr h="370840">
+                <a:tc>
+                  <a:txBody>
+                    <a:bodyPr/>
+                    <a:lstStyle/>
+                    <a:p>
+                      <a:r>
                         <a:rPr b="1" sz="1100"/>
-                        <a:t>TOTAL INVESTMENT</a:t>
+                        <a:t>TOTAL</a:t>
                       </a:r>
                     </a:p>
                   </a:txBody>
@@ -6163,7 +6666,7 @@
                     <a:p>
                       <a:r>
                         <a:rPr b="1" sz="1100"/>
-                        <a:t>$0</a:t>
+                        <a:t>$354,968</a:t>
                       </a:r>
                     </a:p>
                   </a:txBody>
@@ -6180,7 +6683,7 @@
                     <a:p>
                       <a:r>
                         <a:rPr b="1" sz="1100"/>
-                        <a:t>$0</a:t>
+                        <a:t>($21,000)</a:t>
                       </a:r>
                     </a:p>
                   </a:txBody>
@@ -6197,7 +6700,7 @@
                     <a:p>
                       <a:r>
                         <a:rPr b="1" sz="1100"/>
-                        <a:t>$0</a:t>
+                        <a:t>$333,968</a:t>
                       </a:r>
                     </a:p>
                   </a:txBody>
@@ -6214,7 +6717,7 @@
                     <a:p>
                       <a:r>
                         <a:rPr b="1" sz="1100"/>
-                        <a:t>$0</a:t>
+                        <a:t>$217,968</a:t>
                       </a:r>
                     </a:p>
                   </a:txBody>
@@ -6231,7 +6734,7 @@
                     <a:p>
                       <a:r>
                         <a:rPr b="1" sz="1100"/>
-                        <a:t>$0</a:t>
+                        <a:t>$217,968</a:t>
                       </a:r>
                     </a:p>
                   </a:txBody>
@@ -6248,7 +6751,7 @@
                     <a:p>
                       <a:r>
                         <a:rPr b="1" sz="1100"/>
-                        <a:t>$0</a:t>
+                        <a:t>$769,904</a:t>
                       </a:r>
                     </a:p>
                   </a:txBody>
@@ -6263,24 +6766,53 @@
           </a:graphicData>
         </a:graphic>
       </p:graphicFrame>
+      <p:sp>
+        <p:nvSpPr>
+          <p:cNvPr id="5" name="Text Placeholder 4"/>
+          <p:cNvSpPr>
+            <a:spLocks noGrp="1"/>
+          </p:cNvSpPr>
+          <p:nvPr>
+            <p:ph type="body" idx="15" sz="quarter"/>
+          </p:nvPr>
+        </p:nvSpPr>
+        <p:spPr/>
+        <p:txBody>
+          <a:bodyPr/>
+          <a:lstStyle/>
+          <a:p>
+            <a:pPr algn="r">
+              <a:buNone/>
+            </a:pPr>
+            <a:r>
+              <a:rPr sz="1100">
+                <a:solidFill>
+                  <a:srgbClr val="CC0000"/>
+                </a:solidFill>
+              </a:rPr>
+              <a:t>Microsoft Sentinel SIEM Implementation</a:t>
+            </a:r>
+          </a:p>
+        </p:txBody>
+      </p:sp>
       <p:pic>
         <p:nvPicPr>
-          <p:cNvPr id="5" name="Picture 4" descr="eo-framework-logo-real.png"/>
+          <p:cNvPr id="6" name="Picture 5" descr="consulting_company_logo.png"/>
           <p:cNvPicPr>
             <a:picLocks noChangeAspect="1"/>
           </p:cNvPicPr>
           <p:nvPr/>
         </p:nvPicPr>
         <p:blipFill>
-          <a:blip r:embed="rId3"/>
+          <a:blip r:embed="rId2"/>
           <a:stretch>
             <a:fillRect/>
           </a:stretch>
         </p:blipFill>
         <p:spPr>
           <a:xfrm>
-            <a:off x="6684264" y="4535424"/>
-            <a:ext cx="2139696" cy="530352"/>
+            <a:off x="313592" y="4536078"/>
+            <a:ext cx="2126273" cy="529698"/>
           </a:xfrm>
           <a:prstGeom prst="rect">
             <a:avLst/>

</xml_diff>